<commit_message>
Docker ppt updated with Dockerfile slides.
</commit_message>
<xml_diff>
--- a/Docker/Docker.pptx
+++ b/Docker/Docker.pptx
@@ -22,19 +22,25 @@
     <p:sldId id="270" r:id="rId16"/>
     <p:sldId id="272" r:id="rId17"/>
     <p:sldId id="273" r:id="rId18"/>
-    <p:sldId id="267" r:id="rId19"/>
-    <p:sldId id="274" r:id="rId20"/>
-    <p:sldId id="275" r:id="rId21"/>
-    <p:sldId id="276" r:id="rId22"/>
-    <p:sldId id="277" r:id="rId23"/>
-    <p:sldId id="278" r:id="rId24"/>
-    <p:sldId id="279" r:id="rId25"/>
-    <p:sldId id="280" r:id="rId26"/>
-    <p:sldId id="281" r:id="rId27"/>
-    <p:sldId id="282" r:id="rId28"/>
-    <p:sldId id="283" r:id="rId29"/>
-    <p:sldId id="284" r:id="rId30"/>
-    <p:sldId id="285" r:id="rId31"/>
+    <p:sldId id="287" r:id="rId19"/>
+    <p:sldId id="288" r:id="rId20"/>
+    <p:sldId id="289" r:id="rId21"/>
+    <p:sldId id="290" r:id="rId22"/>
+    <p:sldId id="291" r:id="rId23"/>
+    <p:sldId id="286" r:id="rId24"/>
+    <p:sldId id="267" r:id="rId25"/>
+    <p:sldId id="274" r:id="rId26"/>
+    <p:sldId id="275" r:id="rId27"/>
+    <p:sldId id="276" r:id="rId28"/>
+    <p:sldId id="277" r:id="rId29"/>
+    <p:sldId id="278" r:id="rId30"/>
+    <p:sldId id="279" r:id="rId31"/>
+    <p:sldId id="280" r:id="rId32"/>
+    <p:sldId id="281" r:id="rId33"/>
+    <p:sldId id="282" r:id="rId34"/>
+    <p:sldId id="283" r:id="rId35"/>
+    <p:sldId id="284" r:id="rId36"/>
+    <p:sldId id="285" r:id="rId37"/>
   </p:sldIdLst>
   <p:sldSz cx="12192000" cy="6858000"/>
   <p:notesSz cx="6858000" cy="9144000"/>
@@ -4875,7 +4881,7 @@
               <a:rPr lang="en-US" dirty="0">
                 <a:sym typeface="Wingdings" panose="05000000000000000000" pitchFamily="2" charset="2"/>
               </a:rPr>
-              <a:t> is a image layer within the image we build. So to decrease the image layers with in the image, compress the docker file by reducing the number of line, keep all the RUN commands in a single line using &amp;&amp;.</a:t>
+              <a:t> is a image layer within the image we build. So to decrease the image layers with in the image, compress the docker file by reducing the number of lines, keep all the RUN commands in a single line using &amp;&amp;.</a:t>
             </a:r>
           </a:p>
         </p:txBody>
@@ -4915,7 +4921,7 @@
           <p:cNvPr id="2" name="Title 1">
             <a:extLst>
               <a:ext uri="{FF2B5EF4-FFF2-40B4-BE49-F238E27FC236}">
-                <a16:creationId xmlns:a16="http://schemas.microsoft.com/office/drawing/2014/main" id="{1E425675-EF25-42D4-9399-2C6306B8F830}"/>
+                <a16:creationId xmlns:a16="http://schemas.microsoft.com/office/drawing/2014/main" id="{203438A1-327C-4331-BAEE-5925EB12B595}"/>
               </a:ext>
             </a:extLst>
           </p:cNvPr>
@@ -4933,58 +4939,47 @@
           <a:p>
             <a:r>
               <a:rPr lang="en-US" dirty="0"/>
-              <a:t>Docker hub -</a:t>
-            </a:r>
-          </a:p>
-        </p:txBody>
-      </p:sp>
-      <p:sp>
-        <p:nvSpPr>
-          <p:cNvPr id="3" name="Content Placeholder 2">
-            <a:extLst>
-              <a:ext uri="{FF2B5EF4-FFF2-40B4-BE49-F238E27FC236}">
-                <a16:creationId xmlns:a16="http://schemas.microsoft.com/office/drawing/2014/main" id="{40753BF2-CCBA-4441-AE2C-7B003CD9EABC}"/>
-              </a:ext>
-            </a:extLst>
-          </p:cNvPr>
-          <p:cNvSpPr>
-            <a:spLocks noGrp="1"/>
-          </p:cNvSpPr>
+              <a:t>CMD Instruction</a:t>
+            </a:r>
+          </a:p>
+        </p:txBody>
+      </p:sp>
+      <p:pic>
+        <p:nvPicPr>
+          <p:cNvPr id="4" name="Content Placeholder 3">
+            <a:extLst>
+              <a:ext uri="{FF2B5EF4-FFF2-40B4-BE49-F238E27FC236}">
+                <a16:creationId xmlns:a16="http://schemas.microsoft.com/office/drawing/2014/main" id="{6F60C47D-6363-40DE-93B6-C6229054F5F1}"/>
+              </a:ext>
+            </a:extLst>
+          </p:cNvPr>
+          <p:cNvPicPr>
+            <a:picLocks noGrp="1" noChangeAspect="1"/>
+          </p:cNvPicPr>
           <p:nvPr>
             <p:ph idx="1"/>
           </p:nvPr>
-        </p:nvSpPr>
-        <p:spPr/>
-        <p:txBody>
-          <a:bodyPr/>
-          <a:lstStyle/>
-          <a:p>
-            <a:r>
-              <a:rPr lang="en-US" dirty="0"/>
-              <a:t>Remember these two terminologies –</a:t>
-            </a:r>
-          </a:p>
-          <a:p>
-            <a:r>
-              <a:rPr lang="en-US" dirty="0"/>
-              <a:t>Registry – is nothing but that contains a set of repositories in it.</a:t>
-            </a:r>
-          </a:p>
-          <a:p>
-            <a:r>
-              <a:rPr lang="en-US" dirty="0"/>
-              <a:t>Repository – is nothing but that has the actual score code/image.</a:t>
-            </a:r>
-          </a:p>
-          <a:p>
-            <a:endParaRPr lang="en-US" dirty="0"/>
-          </a:p>
-        </p:txBody>
-      </p:sp>
+        </p:nvPicPr>
+        <p:blipFill>
+          <a:blip r:embed="rId2"/>
+          <a:stretch>
+            <a:fillRect/>
+          </a:stretch>
+        </p:blipFill>
+        <p:spPr>
+          <a:xfrm>
+            <a:off x="3005137" y="2548731"/>
+            <a:ext cx="6181725" cy="2905125"/>
+          </a:xfrm>
+          <a:prstGeom prst="rect">
+            <a:avLst/>
+          </a:prstGeom>
+        </p:spPr>
+      </p:pic>
     </p:spTree>
     <p:extLst>
       <p:ext uri="{BB962C8B-B14F-4D97-AF65-F5344CB8AC3E}">
-        <p14:creationId xmlns:p14="http://schemas.microsoft.com/office/powerpoint/2010/main" val="2595150529"/>
+        <p14:creationId xmlns:p14="http://schemas.microsoft.com/office/powerpoint/2010/main" val="1447788418"/>
       </p:ext>
     </p:extLst>
   </p:cSld>
@@ -5016,7 +5011,7 @@
           <p:cNvPr id="2" name="Title 1">
             <a:extLst>
               <a:ext uri="{FF2B5EF4-FFF2-40B4-BE49-F238E27FC236}">
-                <a16:creationId xmlns:a16="http://schemas.microsoft.com/office/drawing/2014/main" id="{B39367E7-0659-4196-8E46-66CE271F3663}"/>
+                <a16:creationId xmlns:a16="http://schemas.microsoft.com/office/drawing/2014/main" id="{C8F078F4-CD6E-4A79-A1BC-F9F3A3F3F29E}"/>
               </a:ext>
             </a:extLst>
           </p:cNvPr>
@@ -5034,193 +5029,47 @@
           <a:p>
             <a:r>
               <a:rPr lang="en-US" dirty="0"/>
-              <a:t>Committing the image to docker hub -</a:t>
-            </a:r>
-          </a:p>
-        </p:txBody>
-      </p:sp>
-      <p:sp>
-        <p:nvSpPr>
-          <p:cNvPr id="3" name="Content Placeholder 2">
-            <a:extLst>
-              <a:ext uri="{FF2B5EF4-FFF2-40B4-BE49-F238E27FC236}">
-                <a16:creationId xmlns:a16="http://schemas.microsoft.com/office/drawing/2014/main" id="{9EF20F50-3EFE-405A-9BB9-2F79EF0BCD8E}"/>
-              </a:ext>
-            </a:extLst>
-          </p:cNvPr>
-          <p:cNvSpPr>
-            <a:spLocks noGrp="1"/>
-          </p:cNvSpPr>
+              <a:t>CMD Instruction</a:t>
+            </a:r>
+          </a:p>
+        </p:txBody>
+      </p:sp>
+      <p:pic>
+        <p:nvPicPr>
+          <p:cNvPr id="4" name="Content Placeholder 3">
+            <a:extLst>
+              <a:ext uri="{FF2B5EF4-FFF2-40B4-BE49-F238E27FC236}">
+                <a16:creationId xmlns:a16="http://schemas.microsoft.com/office/drawing/2014/main" id="{41669B13-9D5C-48A7-8F95-F46DD4FF813D}"/>
+              </a:ext>
+            </a:extLst>
+          </p:cNvPr>
+          <p:cNvPicPr>
+            <a:picLocks noGrp="1" noChangeAspect="1"/>
+          </p:cNvPicPr>
           <p:nvPr>
             <p:ph idx="1"/>
           </p:nvPr>
-        </p:nvSpPr>
-        <p:spPr/>
-        <p:txBody>
-          <a:bodyPr/>
-          <a:lstStyle/>
-          <a:p>
-            <a:r>
-              <a:rPr lang="en-US" dirty="0"/>
-              <a:t>First build your image.</a:t>
-            </a:r>
-          </a:p>
-          <a:p>
-            <a:r>
-              <a:rPr lang="en-US" dirty="0"/>
-              <a:t>Then tag the image– </a:t>
-            </a:r>
-            <a:r>
-              <a:rPr lang="en-US" dirty="0">
-                <a:solidFill>
-                  <a:srgbClr val="FF0000"/>
-                </a:solidFill>
-              </a:rPr>
-              <a:t>docker tag &lt;</a:t>
-            </a:r>
-            <a:r>
-              <a:rPr lang="en-US" dirty="0" err="1">
-                <a:solidFill>
-                  <a:srgbClr val="FF0000"/>
-                </a:solidFill>
-              </a:rPr>
-              <a:t>imageid</a:t>
-            </a:r>
-            <a:r>
-              <a:rPr lang="en-US" dirty="0">
-                <a:solidFill>
-                  <a:srgbClr val="FF0000"/>
-                </a:solidFill>
-              </a:rPr>
-              <a:t>&gt; &lt;</a:t>
-            </a:r>
-            <a:r>
-              <a:rPr lang="en-US" dirty="0" err="1">
-                <a:solidFill>
-                  <a:srgbClr val="FF0000"/>
-                </a:solidFill>
-              </a:rPr>
-              <a:t>reponame</a:t>
-            </a:r>
-            <a:r>
-              <a:rPr lang="en-US" dirty="0">
-                <a:solidFill>
-                  <a:srgbClr val="FF0000"/>
-                </a:solidFill>
-              </a:rPr>
-              <a:t>&gt;:&lt;</a:t>
-            </a:r>
-            <a:r>
-              <a:rPr lang="en-US" dirty="0" err="1">
-                <a:solidFill>
-                  <a:srgbClr val="FF0000"/>
-                </a:solidFill>
-              </a:rPr>
-              <a:t>versionnumber</a:t>
-            </a:r>
-            <a:r>
-              <a:rPr lang="en-US" dirty="0">
-                <a:solidFill>
-                  <a:srgbClr val="FF0000"/>
-                </a:solidFill>
-              </a:rPr>
-              <a:t>&gt;</a:t>
-            </a:r>
-          </a:p>
-          <a:p>
-            <a:r>
-              <a:rPr lang="en-US" dirty="0"/>
-              <a:t>Repo name example – </a:t>
-            </a:r>
-            <a:r>
-              <a:rPr lang="en-US" dirty="0" err="1"/>
-              <a:t>ritesh</a:t>
-            </a:r>
-            <a:r>
-              <a:rPr lang="en-US" dirty="0"/>
-              <a:t>/</a:t>
-            </a:r>
-            <a:r>
-              <a:rPr lang="en-US" dirty="0" err="1"/>
-              <a:t>helloworld</a:t>
-            </a:r>
-            <a:endParaRPr lang="en-US" dirty="0"/>
-          </a:p>
-          <a:p>
-            <a:r>
-              <a:rPr lang="en-US" dirty="0"/>
-              <a:t>Version number example – 1.0</a:t>
-            </a:r>
-          </a:p>
-          <a:p>
-            <a:r>
-              <a:rPr lang="en-US" dirty="0"/>
-              <a:t>Secondly push the image – </a:t>
-            </a:r>
-            <a:r>
-              <a:rPr lang="en-US" dirty="0">
-                <a:solidFill>
-                  <a:srgbClr val="FF0000"/>
-                </a:solidFill>
-              </a:rPr>
-              <a:t>docker push &lt;</a:t>
-            </a:r>
-            <a:r>
-              <a:rPr lang="en-US" dirty="0" err="1">
-                <a:solidFill>
-                  <a:srgbClr val="FF0000"/>
-                </a:solidFill>
-              </a:rPr>
-              <a:t>reponame</a:t>
-            </a:r>
-            <a:r>
-              <a:rPr lang="en-US" dirty="0">
-                <a:solidFill>
-                  <a:srgbClr val="FF0000"/>
-                </a:solidFill>
-              </a:rPr>
-              <a:t>&gt;:&lt;</a:t>
-            </a:r>
-            <a:r>
-              <a:rPr lang="en-US" dirty="0" err="1">
-                <a:solidFill>
-                  <a:srgbClr val="FF0000"/>
-                </a:solidFill>
-              </a:rPr>
-              <a:t>versionnumber</a:t>
-            </a:r>
-            <a:r>
-              <a:rPr lang="en-US" dirty="0">
-                <a:solidFill>
-                  <a:srgbClr val="FF0000"/>
-                </a:solidFill>
-              </a:rPr>
-              <a:t>&gt;</a:t>
-            </a:r>
-          </a:p>
-          <a:p>
-            <a:r>
-              <a:rPr lang="en-US" dirty="0"/>
-              <a:t>That’s it the image is now committed to </a:t>
-            </a:r>
-            <a:r>
-              <a:rPr lang="en-US" dirty="0" err="1"/>
-              <a:t>dockerhub</a:t>
-            </a:r>
-            <a:r>
-              <a:rPr lang="en-US" dirty="0"/>
-              <a:t>.</a:t>
-            </a:r>
-          </a:p>
-          <a:p>
-            <a:endParaRPr lang="en-US" dirty="0"/>
-          </a:p>
-        </p:txBody>
-      </p:sp>
+        </p:nvPicPr>
+        <p:blipFill>
+          <a:blip r:embed="rId2"/>
+          <a:stretch>
+            <a:fillRect/>
+          </a:stretch>
+        </p:blipFill>
+        <p:spPr>
+          <a:xfrm>
+            <a:off x="2076450" y="2467769"/>
+            <a:ext cx="8039100" cy="3067050"/>
+          </a:xfrm>
+          <a:prstGeom prst="rect">
+            <a:avLst/>
+          </a:prstGeom>
+        </p:spPr>
+      </p:pic>
     </p:spTree>
     <p:extLst>
       <p:ext uri="{BB962C8B-B14F-4D97-AF65-F5344CB8AC3E}">
-        <p14:creationId xmlns:p14="http://schemas.microsoft.com/office/powerpoint/2010/main" val="2018118794"/>
+        <p14:creationId xmlns:p14="http://schemas.microsoft.com/office/powerpoint/2010/main" val="2116198223"/>
       </p:ext>
     </p:extLst>
   </p:cSld>
@@ -5359,7 +5208,7 @@
           <p:cNvPr id="2" name="Title 1">
             <a:extLst>
               <a:ext uri="{FF2B5EF4-FFF2-40B4-BE49-F238E27FC236}">
-                <a16:creationId xmlns:a16="http://schemas.microsoft.com/office/drawing/2014/main" id="{A2CF3330-5439-4365-8C47-87B4C7244F17}"/>
+                <a16:creationId xmlns:a16="http://schemas.microsoft.com/office/drawing/2014/main" id="{388995F9-93AD-4C30-9F7D-1CC5D409B2FA}"/>
               </a:ext>
             </a:extLst>
           </p:cNvPr>
@@ -5377,17 +5226,17 @@
           <a:p>
             <a:r>
               <a:rPr lang="en-US" dirty="0"/>
-              <a:t>Private registry –</a:t>
-            </a:r>
-          </a:p>
-        </p:txBody>
-      </p:sp>
-      <p:sp>
-        <p:nvSpPr>
-          <p:cNvPr id="3" name="Content Placeholder 2">
-            <a:extLst>
-              <a:ext uri="{FF2B5EF4-FFF2-40B4-BE49-F238E27FC236}">
-                <a16:creationId xmlns:a16="http://schemas.microsoft.com/office/drawing/2014/main" id="{B554830F-BB18-4C8A-B959-1F4FABEA1E48}"/>
+              <a:t>ENTRYPOINT -</a:t>
+            </a:r>
+          </a:p>
+        </p:txBody>
+      </p:sp>
+      <p:sp>
+        <p:nvSpPr>
+          <p:cNvPr id="6" name="Content Placeholder 5">
+            <a:extLst>
+              <a:ext uri="{FF2B5EF4-FFF2-40B4-BE49-F238E27FC236}">
+                <a16:creationId xmlns:a16="http://schemas.microsoft.com/office/drawing/2014/main" id="{D9E1DC8C-4319-4B93-BF1F-BA7DDFDE2C98}"/>
               </a:ext>
             </a:extLst>
           </p:cNvPr>
@@ -5404,183 +5253,53 @@
           <a:lstStyle/>
           <a:p>
             <a:r>
-              <a:rPr lang="en-US" dirty="0"/>
-              <a:t>Build a private registry :-</a:t>
-            </a:r>
-          </a:p>
-          <a:p>
-            <a:pPr marL="0" indent="0">
-              <a:buNone/>
-            </a:pPr>
-            <a:r>
-              <a:rPr lang="en-US" dirty="0"/>
-              <a:t>                 </a:t>
-            </a:r>
-            <a:r>
-              <a:rPr lang="en-US" dirty="0">
-                <a:solidFill>
-                  <a:srgbClr val="FF0000"/>
-                </a:solidFill>
-              </a:rPr>
-              <a:t>docker run –d –p 5000:5000 registry </a:t>
-            </a:r>
-            <a:r>
-              <a:rPr lang="en-US" dirty="0"/>
-              <a:t>-</a:t>
-            </a:r>
-            <a:r>
-              <a:rPr lang="en-US" dirty="0">
-                <a:sym typeface="Wingdings" panose="05000000000000000000" pitchFamily="2" charset="2"/>
-              </a:rPr>
-              <a:t> spins a registry –p means private –d means detached, port 5000 on docker host is mapped to port 5000 on the container.</a:t>
-            </a:r>
-          </a:p>
-          <a:p>
-            <a:pPr marL="0" indent="0">
-              <a:buNone/>
-            </a:pPr>
-            <a:r>
-              <a:rPr lang="en-US" dirty="0">
-                <a:sym typeface="Wingdings" panose="05000000000000000000" pitchFamily="2" charset="2"/>
-              </a:rPr>
-              <a:t>You can access this by :- docker_hostip:5000</a:t>
-            </a:r>
-          </a:p>
-          <a:p>
-            <a:pPr marL="0" indent="0">
-              <a:buNone/>
-            </a:pPr>
-            <a:r>
-              <a:rPr lang="en-US" dirty="0">
-                <a:sym typeface="Wingdings" panose="05000000000000000000" pitchFamily="2" charset="2"/>
-              </a:rPr>
-              <a:t>Using a private registry –</a:t>
-            </a:r>
-          </a:p>
-          <a:p>
-            <a:pPr marL="0" indent="0">
-              <a:buNone/>
-            </a:pPr>
-            <a:r>
-              <a:rPr lang="en-US" dirty="0">
-                <a:sym typeface="Wingdings" panose="05000000000000000000" pitchFamily="2" charset="2"/>
-              </a:rPr>
-              <a:t>Commit to a private registry – </a:t>
-            </a:r>
-          </a:p>
-          <a:p>
-            <a:pPr marL="0" indent="0">
-              <a:buNone/>
-            </a:pPr>
-            <a:r>
-              <a:rPr lang="en-US" dirty="0">
-                <a:solidFill>
-                  <a:srgbClr val="FF0000"/>
-                </a:solidFill>
-                <a:sym typeface="Wingdings" panose="05000000000000000000" pitchFamily="2" charset="2"/>
-              </a:rPr>
-              <a:t>docker tag &lt;</a:t>
-            </a:r>
-            <a:r>
-              <a:rPr lang="en-US" dirty="0" err="1">
-                <a:solidFill>
-                  <a:srgbClr val="FF0000"/>
-                </a:solidFill>
-                <a:sym typeface="Wingdings" panose="05000000000000000000" pitchFamily="2" charset="2"/>
-              </a:rPr>
-              <a:t>imageid</a:t>
-            </a:r>
-            <a:r>
-              <a:rPr lang="en-US" dirty="0">
-                <a:solidFill>
-                  <a:srgbClr val="FF0000"/>
-                </a:solidFill>
-                <a:sym typeface="Wingdings" panose="05000000000000000000" pitchFamily="2" charset="2"/>
-              </a:rPr>
-              <a:t>&gt; docker_hostip:5000/&lt;</a:t>
-            </a:r>
-            <a:r>
-              <a:rPr lang="en-US" dirty="0" err="1">
-                <a:solidFill>
-                  <a:srgbClr val="FF0000"/>
-                </a:solidFill>
-                <a:sym typeface="Wingdings" panose="05000000000000000000" pitchFamily="2" charset="2"/>
-              </a:rPr>
-              <a:t>reponame</a:t>
-            </a:r>
-            <a:r>
-              <a:rPr lang="en-US" dirty="0">
-                <a:solidFill>
-                  <a:srgbClr val="FF0000"/>
-                </a:solidFill>
-                <a:sym typeface="Wingdings" panose="05000000000000000000" pitchFamily="2" charset="2"/>
-              </a:rPr>
-              <a:t>&gt;</a:t>
-            </a:r>
-          </a:p>
-          <a:p>
-            <a:pPr marL="0" indent="0">
-              <a:buNone/>
-            </a:pPr>
-            <a:r>
-              <a:rPr lang="en-US" dirty="0">
-                <a:solidFill>
-                  <a:srgbClr val="FF0000"/>
-                </a:solidFill>
-                <a:sym typeface="Wingdings" panose="05000000000000000000" pitchFamily="2" charset="2"/>
-              </a:rPr>
-              <a:t>docker push docker_hostip:5000/&lt;</a:t>
-            </a:r>
-            <a:r>
-              <a:rPr lang="en-US" dirty="0" err="1">
-                <a:solidFill>
-                  <a:srgbClr val="FF0000"/>
-                </a:solidFill>
-                <a:sym typeface="Wingdings" panose="05000000000000000000" pitchFamily="2" charset="2"/>
-              </a:rPr>
-              <a:t>reponame</a:t>
-            </a:r>
-            <a:r>
-              <a:rPr lang="en-US" dirty="0">
-                <a:solidFill>
-                  <a:srgbClr val="FF0000"/>
-                </a:solidFill>
-                <a:sym typeface="Wingdings" panose="05000000000000000000" pitchFamily="2" charset="2"/>
-              </a:rPr>
-              <a:t>&gt;</a:t>
-            </a:r>
-          </a:p>
-          <a:p>
-            <a:pPr marL="0" indent="0">
-              <a:buNone/>
-            </a:pPr>
-            <a:endParaRPr lang="en-US" dirty="0">
-              <a:solidFill>
-                <a:srgbClr val="FF0000"/>
-              </a:solidFill>
-              <a:sym typeface="Wingdings" panose="05000000000000000000" pitchFamily="2" charset="2"/>
-            </a:endParaRPr>
-          </a:p>
-          <a:p>
-            <a:pPr marL="0" indent="0">
-              <a:buNone/>
-            </a:pPr>
-            <a:endParaRPr lang="en-US" dirty="0">
-              <a:sym typeface="Wingdings" panose="05000000000000000000" pitchFamily="2" charset="2"/>
-            </a:endParaRPr>
-          </a:p>
-          <a:p>
-            <a:pPr marL="0" indent="0">
-              <a:buNone/>
-            </a:pPr>
+              <a:rPr lang="en-US" dirty="0" err="1"/>
+              <a:t>Ofcourse</a:t>
+            </a:r>
+            <a:r>
+              <a:rPr lang="en-US" dirty="0"/>
+              <a:t>, CMD is used to run your app inside the container, but ENTRYPOINT is better/recommended way.</a:t>
+            </a:r>
+          </a:p>
+          <a:p>
             <a:endParaRPr lang="en-US" dirty="0"/>
           </a:p>
         </p:txBody>
       </p:sp>
+      <p:pic>
+        <p:nvPicPr>
+          <p:cNvPr id="7" name="Picture 6">
+            <a:extLst>
+              <a:ext uri="{FF2B5EF4-FFF2-40B4-BE49-F238E27FC236}">
+                <a16:creationId xmlns:a16="http://schemas.microsoft.com/office/drawing/2014/main" id="{71C32E14-7610-46BB-9421-4CC0674638CC}"/>
+              </a:ext>
+            </a:extLst>
+          </p:cNvPr>
+          <p:cNvPicPr>
+            <a:picLocks noChangeAspect="1"/>
+          </p:cNvPicPr>
+          <p:nvPr/>
+        </p:nvPicPr>
+        <p:blipFill>
+          <a:blip r:embed="rId2"/>
+          <a:stretch>
+            <a:fillRect/>
+          </a:stretch>
+        </p:blipFill>
+        <p:spPr>
+          <a:xfrm>
+            <a:off x="3205419" y="2931898"/>
+            <a:ext cx="5534025" cy="1809750"/>
+          </a:xfrm>
+          <a:prstGeom prst="rect">
+            <a:avLst/>
+          </a:prstGeom>
+        </p:spPr>
+      </p:pic>
     </p:spTree>
     <p:extLst>
       <p:ext uri="{BB962C8B-B14F-4D97-AF65-F5344CB8AC3E}">
-        <p14:creationId xmlns:p14="http://schemas.microsoft.com/office/powerpoint/2010/main" val="1401829633"/>
+        <p14:creationId xmlns:p14="http://schemas.microsoft.com/office/powerpoint/2010/main" val="2371106316"/>
       </p:ext>
     </p:extLst>
   </p:cSld>
@@ -5609,10 +5328,38 @@
       </p:grpSpPr>
       <p:sp>
         <p:nvSpPr>
+          <p:cNvPr id="2" name="Title 1">
+            <a:extLst>
+              <a:ext uri="{FF2B5EF4-FFF2-40B4-BE49-F238E27FC236}">
+                <a16:creationId xmlns:a16="http://schemas.microsoft.com/office/drawing/2014/main" id="{23C79FBC-D701-4B8B-9BC0-24F7FA846CEE}"/>
+              </a:ext>
+            </a:extLst>
+          </p:cNvPr>
+          <p:cNvSpPr>
+            <a:spLocks noGrp="1"/>
+          </p:cNvSpPr>
+          <p:nvPr>
+            <p:ph type="title"/>
+          </p:nvPr>
+        </p:nvSpPr>
+        <p:spPr/>
+        <p:txBody>
+          <a:bodyPr/>
+          <a:lstStyle/>
+          <a:p>
+            <a:r>
+              <a:rPr lang="en-US" dirty="0"/>
+              <a:t>ENV instruction -</a:t>
+            </a:r>
+          </a:p>
+        </p:txBody>
+      </p:sp>
+      <p:sp>
+        <p:nvSpPr>
           <p:cNvPr id="3" name="Content Placeholder 2">
             <a:extLst>
               <a:ext uri="{FF2B5EF4-FFF2-40B4-BE49-F238E27FC236}">
-                <a16:creationId xmlns:a16="http://schemas.microsoft.com/office/drawing/2014/main" id="{AEE70128-805E-4E66-86D3-C558C0FCD3AC}"/>
+                <a16:creationId xmlns:a16="http://schemas.microsoft.com/office/drawing/2014/main" id="{A2870523-256E-4F37-8B12-C8FD856786E2}"/>
               </a:ext>
             </a:extLst>
           </p:cNvPr>
@@ -5623,89 +5370,39 @@
             <p:ph idx="1"/>
           </p:nvPr>
         </p:nvSpPr>
-        <p:spPr>
-          <a:xfrm>
-            <a:off x="838200" y="407773"/>
-            <a:ext cx="10515600" cy="5769190"/>
-          </a:xfrm>
-        </p:spPr>
+        <p:spPr/>
         <p:txBody>
           <a:bodyPr/>
           <a:lstStyle/>
           <a:p>
             <a:r>
               <a:rPr lang="en-US" dirty="0"/>
-              <a:t>Pulling a image from private registry –</a:t>
-            </a:r>
-          </a:p>
-          <a:p>
-            <a:r>
-              <a:rPr lang="en-US" dirty="0"/>
-              <a:t>docker run –d </a:t>
-            </a:r>
-            <a:r>
-              <a:rPr lang="en-US" dirty="0">
-                <a:solidFill>
-                  <a:srgbClr val="FF0000"/>
-                </a:solidFill>
-                <a:sym typeface="Wingdings" panose="05000000000000000000" pitchFamily="2" charset="2"/>
-              </a:rPr>
-              <a:t>docker_hostip:5000/&lt;</a:t>
-            </a:r>
-            <a:r>
-              <a:rPr lang="en-US" dirty="0" err="1">
-                <a:solidFill>
-                  <a:srgbClr val="FF0000"/>
-                </a:solidFill>
-                <a:sym typeface="Wingdings" panose="05000000000000000000" pitchFamily="2" charset="2"/>
-              </a:rPr>
-              <a:t>reponame</a:t>
-            </a:r>
-            <a:r>
-              <a:rPr lang="en-US" dirty="0">
-                <a:solidFill>
-                  <a:srgbClr val="FF0000"/>
-                </a:solidFill>
-                <a:sym typeface="Wingdings" panose="05000000000000000000" pitchFamily="2" charset="2"/>
-              </a:rPr>
-              <a:t>&gt;:&lt;</a:t>
-            </a:r>
-            <a:r>
-              <a:rPr lang="en-US" dirty="0" err="1">
-                <a:solidFill>
-                  <a:srgbClr val="FF0000"/>
-                </a:solidFill>
-                <a:sym typeface="Wingdings" panose="05000000000000000000" pitchFamily="2" charset="2"/>
-              </a:rPr>
-              <a:t>versionno</a:t>
-            </a:r>
-            <a:r>
-              <a:rPr lang="en-US" dirty="0">
-                <a:solidFill>
-                  <a:srgbClr val="FF0000"/>
-                </a:solidFill>
-                <a:sym typeface="Wingdings" panose="05000000000000000000" pitchFamily="2" charset="2"/>
-              </a:rPr>
-              <a:t>&gt;</a:t>
-            </a:r>
-          </a:p>
-          <a:p>
-            <a:pPr marL="0" indent="0">
-              <a:buNone/>
-            </a:pPr>
-            <a:endParaRPr lang="en-US" dirty="0">
-              <a:solidFill>
-                <a:srgbClr val="FF0000"/>
-              </a:solidFill>
-              <a:sym typeface="Wingdings" panose="05000000000000000000" pitchFamily="2" charset="2"/>
-            </a:endParaRPr>
+              <a:t>ENV </a:t>
+            </a:r>
+            <a:r>
+              <a:rPr lang="en-US" dirty="0" err="1"/>
+              <a:t>var</a:t>
+            </a:r>
+            <a:r>
+              <a:rPr lang="en-US" dirty="0"/>
+              <a:t>=value</a:t>
+            </a:r>
+          </a:p>
+          <a:p>
+            <a:r>
+              <a:rPr lang="en-US" dirty="0"/>
+              <a:t>Is used to set the environment variables in the container.</a:t>
+            </a:r>
+          </a:p>
+          <a:p>
+            <a:endParaRPr lang="en-US" dirty="0"/>
           </a:p>
         </p:txBody>
       </p:sp>
     </p:spTree>
     <p:extLst>
       <p:ext uri="{BB962C8B-B14F-4D97-AF65-F5344CB8AC3E}">
-        <p14:creationId xmlns:p14="http://schemas.microsoft.com/office/powerpoint/2010/main" val="2552398434"/>
+        <p14:creationId xmlns:p14="http://schemas.microsoft.com/office/powerpoint/2010/main" val="2573914009"/>
       </p:ext>
     </p:extLst>
   </p:cSld>
@@ -5737,6 +5434,1040 @@
           <p:cNvPr id="2" name="Title 1">
             <a:extLst>
               <a:ext uri="{FF2B5EF4-FFF2-40B4-BE49-F238E27FC236}">
+                <a16:creationId xmlns:a16="http://schemas.microsoft.com/office/drawing/2014/main" id="{FD29FB2D-D05A-4221-BD88-75CC786696FD}"/>
+              </a:ext>
+            </a:extLst>
+          </p:cNvPr>
+          <p:cNvSpPr>
+            <a:spLocks noGrp="1"/>
+          </p:cNvSpPr>
+          <p:nvPr>
+            <p:ph type="title"/>
+          </p:nvPr>
+        </p:nvSpPr>
+        <p:spPr/>
+        <p:txBody>
+          <a:bodyPr/>
+          <a:lstStyle/>
+          <a:p>
+            <a:r>
+              <a:rPr lang="en-US" dirty="0"/>
+              <a:t>Volumes -</a:t>
+            </a:r>
+          </a:p>
+        </p:txBody>
+      </p:sp>
+      <p:sp>
+        <p:nvSpPr>
+          <p:cNvPr id="3" name="Content Placeholder 2">
+            <a:extLst>
+              <a:ext uri="{FF2B5EF4-FFF2-40B4-BE49-F238E27FC236}">
+                <a16:creationId xmlns:a16="http://schemas.microsoft.com/office/drawing/2014/main" id="{72A1C8EA-6F42-4476-81E9-0523CD899635}"/>
+              </a:ext>
+            </a:extLst>
+          </p:cNvPr>
+          <p:cNvSpPr>
+            <a:spLocks noGrp="1"/>
+          </p:cNvSpPr>
+          <p:nvPr>
+            <p:ph idx="1"/>
+          </p:nvPr>
+        </p:nvSpPr>
+        <p:spPr/>
+        <p:txBody>
+          <a:bodyPr>
+            <a:normAutofit fontScale="92500"/>
+          </a:bodyPr>
+          <a:lstStyle/>
+          <a:p>
+            <a:r>
+              <a:rPr lang="en-US" dirty="0"/>
+              <a:t> </a:t>
+            </a:r>
+            <a:r>
+              <a:rPr lang="en-US" dirty="0">
+                <a:solidFill>
+                  <a:srgbClr val="FF0000"/>
+                </a:solidFill>
+              </a:rPr>
+              <a:t>docker run –v /</a:t>
+            </a:r>
+            <a:r>
+              <a:rPr lang="en-US" dirty="0" err="1">
+                <a:solidFill>
+                  <a:srgbClr val="FF0000"/>
+                </a:solidFill>
+              </a:rPr>
+              <a:t>pathondockerhost</a:t>
+            </a:r>
+            <a:r>
+              <a:rPr lang="en-US" dirty="0">
+                <a:solidFill>
+                  <a:srgbClr val="FF0000"/>
+                </a:solidFill>
+              </a:rPr>
+              <a:t> &lt;</a:t>
+            </a:r>
+            <a:r>
+              <a:rPr lang="en-US" dirty="0" err="1">
+                <a:solidFill>
+                  <a:srgbClr val="FF0000"/>
+                </a:solidFill>
+              </a:rPr>
+              <a:t>image_name</a:t>
+            </a:r>
+            <a:r>
+              <a:rPr lang="en-US" dirty="0">
+                <a:solidFill>
+                  <a:srgbClr val="FF0000"/>
+                </a:solidFill>
+              </a:rPr>
+              <a:t>&gt;</a:t>
+            </a:r>
+          </a:p>
+          <a:p>
+            <a:r>
+              <a:rPr lang="en-US" dirty="0"/>
+              <a:t>So –v is the tag used to tell the docker that to store the volume on docker host at the specified path along with the volume in the container.</a:t>
+            </a:r>
+          </a:p>
+          <a:p>
+            <a:r>
+              <a:rPr lang="en-US" dirty="0"/>
+              <a:t>So if you want to link the new container to the volume of other container –</a:t>
+            </a:r>
+          </a:p>
+          <a:p>
+            <a:r>
+              <a:rPr lang="en-US" dirty="0"/>
+              <a:t> </a:t>
+            </a:r>
+            <a:r>
+              <a:rPr lang="en-US" dirty="0">
+                <a:solidFill>
+                  <a:srgbClr val="FF0000"/>
+                </a:solidFill>
+              </a:rPr>
+              <a:t>docker run --volumes-from=&lt;</a:t>
+            </a:r>
+            <a:r>
+              <a:rPr lang="en-US" dirty="0" err="1">
+                <a:solidFill>
+                  <a:srgbClr val="FF0000"/>
+                </a:solidFill>
+              </a:rPr>
+              <a:t>previouscontainername</a:t>
+            </a:r>
+            <a:r>
+              <a:rPr lang="en-US" dirty="0">
+                <a:solidFill>
+                  <a:srgbClr val="FF0000"/>
+                </a:solidFill>
+              </a:rPr>
+              <a:t>&gt; &lt;</a:t>
+            </a:r>
+            <a:r>
+              <a:rPr lang="en-US" dirty="0" err="1">
+                <a:solidFill>
+                  <a:srgbClr val="FF0000"/>
+                </a:solidFill>
+              </a:rPr>
+              <a:t>image_name</a:t>
+            </a:r>
+            <a:r>
+              <a:rPr lang="en-US" dirty="0">
+                <a:solidFill>
+                  <a:srgbClr val="FF0000"/>
+                </a:solidFill>
+              </a:rPr>
+              <a:t>&gt;</a:t>
+            </a:r>
+          </a:p>
+          <a:p>
+            <a:r>
+              <a:rPr lang="en-US" dirty="0"/>
+              <a:t>Suppose you want a data directory from docker host to be mounted on data directory of the container –</a:t>
+            </a:r>
+          </a:p>
+          <a:p>
+            <a:r>
+              <a:rPr lang="en-US" dirty="0">
+                <a:solidFill>
+                  <a:srgbClr val="FF0000"/>
+                </a:solidFill>
+              </a:rPr>
+              <a:t> docker run –v /data:/data &lt;</a:t>
+            </a:r>
+            <a:r>
+              <a:rPr lang="en-US" dirty="0" err="1">
+                <a:solidFill>
+                  <a:srgbClr val="FF0000"/>
+                </a:solidFill>
+              </a:rPr>
+              <a:t>image_name</a:t>
+            </a:r>
+            <a:r>
+              <a:rPr lang="en-US" dirty="0">
+                <a:solidFill>
+                  <a:srgbClr val="FF0000"/>
+                </a:solidFill>
+              </a:rPr>
+              <a:t>&gt;</a:t>
+            </a:r>
+            <a:endParaRPr lang="en-US" dirty="0"/>
+          </a:p>
+        </p:txBody>
+      </p:sp>
+    </p:spTree>
+    <p:extLst>
+      <p:ext uri="{BB962C8B-B14F-4D97-AF65-F5344CB8AC3E}">
+        <p14:creationId xmlns:p14="http://schemas.microsoft.com/office/powerpoint/2010/main" val="3183534215"/>
+      </p:ext>
+    </p:extLst>
+  </p:cSld>
+  <p:clrMapOvr>
+    <a:masterClrMapping/>
+  </p:clrMapOvr>
+</p:sld>
+</file>
+
+<file path=ppt/slides/slide23.xml><?xml version="1.0" encoding="utf-8"?>
+<p:sld xmlns:a="http://schemas.openxmlformats.org/drawingml/2006/main" xmlns:r="http://schemas.openxmlformats.org/officeDocument/2006/relationships" xmlns:p="http://schemas.openxmlformats.org/presentationml/2006/main">
+  <p:cSld>
+    <p:spTree>
+      <p:nvGrpSpPr>
+        <p:cNvPr id="1" name=""/>
+        <p:cNvGrpSpPr/>
+        <p:nvPr/>
+      </p:nvGrpSpPr>
+      <p:grpSpPr>
+        <a:xfrm>
+          <a:off x="0" y="0"/>
+          <a:ext cx="0" cy="0"/>
+          <a:chOff x="0" y="0"/>
+          <a:chExt cx="0" cy="0"/>
+        </a:xfrm>
+      </p:grpSpPr>
+      <p:sp>
+        <p:nvSpPr>
+          <p:cNvPr id="2" name="Title 1">
+            <a:extLst>
+              <a:ext uri="{FF2B5EF4-FFF2-40B4-BE49-F238E27FC236}">
+                <a16:creationId xmlns:a16="http://schemas.microsoft.com/office/drawing/2014/main" id="{34136C85-F1E2-45C4-9CE6-439C374606DA}"/>
+              </a:ext>
+            </a:extLst>
+          </p:cNvPr>
+          <p:cNvSpPr>
+            <a:spLocks noGrp="1"/>
+          </p:cNvSpPr>
+          <p:nvPr>
+            <p:ph type="title"/>
+          </p:nvPr>
+        </p:nvSpPr>
+        <p:spPr/>
+        <p:txBody>
+          <a:bodyPr/>
+          <a:lstStyle/>
+          <a:p>
+            <a:r>
+              <a:rPr lang="en-US" dirty="0"/>
+              <a:t>Build cache</a:t>
+            </a:r>
+          </a:p>
+        </p:txBody>
+      </p:sp>
+      <p:sp>
+        <p:nvSpPr>
+          <p:cNvPr id="3" name="Content Placeholder 2">
+            <a:extLst>
+              <a:ext uri="{FF2B5EF4-FFF2-40B4-BE49-F238E27FC236}">
+                <a16:creationId xmlns:a16="http://schemas.microsoft.com/office/drawing/2014/main" id="{2F406838-8FA8-4C75-BA1F-E4DA869EE69F}"/>
+              </a:ext>
+            </a:extLst>
+          </p:cNvPr>
+          <p:cNvSpPr>
+            <a:spLocks noGrp="1"/>
+          </p:cNvSpPr>
+          <p:nvPr>
+            <p:ph idx="1"/>
+          </p:nvPr>
+        </p:nvSpPr>
+        <p:spPr/>
+        <p:txBody>
+          <a:bodyPr/>
+          <a:lstStyle/>
+          <a:p>
+            <a:r>
+              <a:rPr lang="en-US" dirty="0"/>
+              <a:t>Docker store the builds cache.</a:t>
+            </a:r>
+          </a:p>
+          <a:p>
+            <a:r>
+              <a:rPr lang="en-US" dirty="0"/>
+              <a:t>So when you build the file again with the same </a:t>
+            </a:r>
+            <a:r>
+              <a:rPr lang="en-US" dirty="0" err="1"/>
+              <a:t>dockerfile</a:t>
+            </a:r>
+            <a:r>
+              <a:rPr lang="en-US" dirty="0"/>
+              <a:t>, the build is done quickly as the build cache is stored.</a:t>
+            </a:r>
+          </a:p>
+        </p:txBody>
+      </p:sp>
+    </p:spTree>
+    <p:extLst>
+      <p:ext uri="{BB962C8B-B14F-4D97-AF65-F5344CB8AC3E}">
+        <p14:creationId xmlns:p14="http://schemas.microsoft.com/office/powerpoint/2010/main" val="24467976"/>
+      </p:ext>
+    </p:extLst>
+  </p:cSld>
+  <p:clrMapOvr>
+    <a:masterClrMapping/>
+  </p:clrMapOvr>
+</p:sld>
+</file>
+
+<file path=ppt/slides/slide24.xml><?xml version="1.0" encoding="utf-8"?>
+<p:sld xmlns:a="http://schemas.openxmlformats.org/drawingml/2006/main" xmlns:r="http://schemas.openxmlformats.org/officeDocument/2006/relationships" xmlns:p="http://schemas.openxmlformats.org/presentationml/2006/main">
+  <p:cSld>
+    <p:spTree>
+      <p:nvGrpSpPr>
+        <p:cNvPr id="1" name=""/>
+        <p:cNvGrpSpPr/>
+        <p:nvPr/>
+      </p:nvGrpSpPr>
+      <p:grpSpPr>
+        <a:xfrm>
+          <a:off x="0" y="0"/>
+          <a:ext cx="0" cy="0"/>
+          <a:chOff x="0" y="0"/>
+          <a:chExt cx="0" cy="0"/>
+        </a:xfrm>
+      </p:grpSpPr>
+      <p:sp>
+        <p:nvSpPr>
+          <p:cNvPr id="2" name="Title 1">
+            <a:extLst>
+              <a:ext uri="{FF2B5EF4-FFF2-40B4-BE49-F238E27FC236}">
+                <a16:creationId xmlns:a16="http://schemas.microsoft.com/office/drawing/2014/main" id="{1E425675-EF25-42D4-9399-2C6306B8F830}"/>
+              </a:ext>
+            </a:extLst>
+          </p:cNvPr>
+          <p:cNvSpPr>
+            <a:spLocks noGrp="1"/>
+          </p:cNvSpPr>
+          <p:nvPr>
+            <p:ph type="title"/>
+          </p:nvPr>
+        </p:nvSpPr>
+        <p:spPr/>
+        <p:txBody>
+          <a:bodyPr/>
+          <a:lstStyle/>
+          <a:p>
+            <a:r>
+              <a:rPr lang="en-US" dirty="0"/>
+              <a:t>Docker hub -</a:t>
+            </a:r>
+          </a:p>
+        </p:txBody>
+      </p:sp>
+      <p:sp>
+        <p:nvSpPr>
+          <p:cNvPr id="3" name="Content Placeholder 2">
+            <a:extLst>
+              <a:ext uri="{FF2B5EF4-FFF2-40B4-BE49-F238E27FC236}">
+                <a16:creationId xmlns:a16="http://schemas.microsoft.com/office/drawing/2014/main" id="{40753BF2-CCBA-4441-AE2C-7B003CD9EABC}"/>
+              </a:ext>
+            </a:extLst>
+          </p:cNvPr>
+          <p:cNvSpPr>
+            <a:spLocks noGrp="1"/>
+          </p:cNvSpPr>
+          <p:nvPr>
+            <p:ph idx="1"/>
+          </p:nvPr>
+        </p:nvSpPr>
+        <p:spPr/>
+        <p:txBody>
+          <a:bodyPr/>
+          <a:lstStyle/>
+          <a:p>
+            <a:r>
+              <a:rPr lang="en-US" dirty="0"/>
+              <a:t>Remember these two terminologies –</a:t>
+            </a:r>
+          </a:p>
+          <a:p>
+            <a:r>
+              <a:rPr lang="en-US" dirty="0"/>
+              <a:t>Registry – is nothing but that contains a set of repositories in it.</a:t>
+            </a:r>
+          </a:p>
+          <a:p>
+            <a:r>
+              <a:rPr lang="en-US" dirty="0"/>
+              <a:t>Repository – is nothing but that has the actual score code/image.</a:t>
+            </a:r>
+          </a:p>
+          <a:p>
+            <a:endParaRPr lang="en-US" dirty="0"/>
+          </a:p>
+        </p:txBody>
+      </p:sp>
+    </p:spTree>
+    <p:extLst>
+      <p:ext uri="{BB962C8B-B14F-4D97-AF65-F5344CB8AC3E}">
+        <p14:creationId xmlns:p14="http://schemas.microsoft.com/office/powerpoint/2010/main" val="2595150529"/>
+      </p:ext>
+    </p:extLst>
+  </p:cSld>
+  <p:clrMapOvr>
+    <a:masterClrMapping/>
+  </p:clrMapOvr>
+</p:sld>
+</file>
+
+<file path=ppt/slides/slide25.xml><?xml version="1.0" encoding="utf-8"?>
+<p:sld xmlns:a="http://schemas.openxmlformats.org/drawingml/2006/main" xmlns:r="http://schemas.openxmlformats.org/officeDocument/2006/relationships" xmlns:p="http://schemas.openxmlformats.org/presentationml/2006/main">
+  <p:cSld>
+    <p:spTree>
+      <p:nvGrpSpPr>
+        <p:cNvPr id="1" name=""/>
+        <p:cNvGrpSpPr/>
+        <p:nvPr/>
+      </p:nvGrpSpPr>
+      <p:grpSpPr>
+        <a:xfrm>
+          <a:off x="0" y="0"/>
+          <a:ext cx="0" cy="0"/>
+          <a:chOff x="0" y="0"/>
+          <a:chExt cx="0" cy="0"/>
+        </a:xfrm>
+      </p:grpSpPr>
+      <p:sp>
+        <p:nvSpPr>
+          <p:cNvPr id="2" name="Title 1">
+            <a:extLst>
+              <a:ext uri="{FF2B5EF4-FFF2-40B4-BE49-F238E27FC236}">
+                <a16:creationId xmlns:a16="http://schemas.microsoft.com/office/drawing/2014/main" id="{B39367E7-0659-4196-8E46-66CE271F3663}"/>
+              </a:ext>
+            </a:extLst>
+          </p:cNvPr>
+          <p:cNvSpPr>
+            <a:spLocks noGrp="1"/>
+          </p:cNvSpPr>
+          <p:nvPr>
+            <p:ph type="title"/>
+          </p:nvPr>
+        </p:nvSpPr>
+        <p:spPr/>
+        <p:txBody>
+          <a:bodyPr/>
+          <a:lstStyle/>
+          <a:p>
+            <a:r>
+              <a:rPr lang="en-US" dirty="0"/>
+              <a:t>Committing the image to docker hub -</a:t>
+            </a:r>
+          </a:p>
+        </p:txBody>
+      </p:sp>
+      <p:sp>
+        <p:nvSpPr>
+          <p:cNvPr id="3" name="Content Placeholder 2">
+            <a:extLst>
+              <a:ext uri="{FF2B5EF4-FFF2-40B4-BE49-F238E27FC236}">
+                <a16:creationId xmlns:a16="http://schemas.microsoft.com/office/drawing/2014/main" id="{9EF20F50-3EFE-405A-9BB9-2F79EF0BCD8E}"/>
+              </a:ext>
+            </a:extLst>
+          </p:cNvPr>
+          <p:cNvSpPr>
+            <a:spLocks noGrp="1"/>
+          </p:cNvSpPr>
+          <p:nvPr>
+            <p:ph idx="1"/>
+          </p:nvPr>
+        </p:nvSpPr>
+        <p:spPr/>
+        <p:txBody>
+          <a:bodyPr/>
+          <a:lstStyle/>
+          <a:p>
+            <a:r>
+              <a:rPr lang="en-US" dirty="0"/>
+              <a:t>First build your image.</a:t>
+            </a:r>
+          </a:p>
+          <a:p>
+            <a:r>
+              <a:rPr lang="en-US" dirty="0"/>
+              <a:t>Then tag the image– </a:t>
+            </a:r>
+            <a:r>
+              <a:rPr lang="en-US" dirty="0">
+                <a:solidFill>
+                  <a:srgbClr val="FF0000"/>
+                </a:solidFill>
+              </a:rPr>
+              <a:t>docker tag &lt;</a:t>
+            </a:r>
+            <a:r>
+              <a:rPr lang="en-US" dirty="0" err="1">
+                <a:solidFill>
+                  <a:srgbClr val="FF0000"/>
+                </a:solidFill>
+              </a:rPr>
+              <a:t>imageid</a:t>
+            </a:r>
+            <a:r>
+              <a:rPr lang="en-US" dirty="0">
+                <a:solidFill>
+                  <a:srgbClr val="FF0000"/>
+                </a:solidFill>
+              </a:rPr>
+              <a:t>&gt; &lt;</a:t>
+            </a:r>
+            <a:r>
+              <a:rPr lang="en-US" dirty="0" err="1">
+                <a:solidFill>
+                  <a:srgbClr val="FF0000"/>
+                </a:solidFill>
+              </a:rPr>
+              <a:t>reponame</a:t>
+            </a:r>
+            <a:r>
+              <a:rPr lang="en-US" dirty="0">
+                <a:solidFill>
+                  <a:srgbClr val="FF0000"/>
+                </a:solidFill>
+              </a:rPr>
+              <a:t>&gt;:&lt;</a:t>
+            </a:r>
+            <a:r>
+              <a:rPr lang="en-US" dirty="0" err="1">
+                <a:solidFill>
+                  <a:srgbClr val="FF0000"/>
+                </a:solidFill>
+              </a:rPr>
+              <a:t>versionnumber</a:t>
+            </a:r>
+            <a:r>
+              <a:rPr lang="en-US" dirty="0">
+                <a:solidFill>
+                  <a:srgbClr val="FF0000"/>
+                </a:solidFill>
+              </a:rPr>
+              <a:t>&gt;</a:t>
+            </a:r>
+          </a:p>
+          <a:p>
+            <a:r>
+              <a:rPr lang="en-US" dirty="0"/>
+              <a:t>Repo name example – </a:t>
+            </a:r>
+            <a:r>
+              <a:rPr lang="en-US" dirty="0" err="1"/>
+              <a:t>ritesh</a:t>
+            </a:r>
+            <a:r>
+              <a:rPr lang="en-US" dirty="0"/>
+              <a:t>/</a:t>
+            </a:r>
+            <a:r>
+              <a:rPr lang="en-US" dirty="0" err="1"/>
+              <a:t>helloworld</a:t>
+            </a:r>
+            <a:endParaRPr lang="en-US" dirty="0"/>
+          </a:p>
+          <a:p>
+            <a:r>
+              <a:rPr lang="en-US" dirty="0"/>
+              <a:t>Version number example – 1.0</a:t>
+            </a:r>
+          </a:p>
+          <a:p>
+            <a:r>
+              <a:rPr lang="en-US" dirty="0"/>
+              <a:t>Secondly push the image – </a:t>
+            </a:r>
+            <a:r>
+              <a:rPr lang="en-US" dirty="0">
+                <a:solidFill>
+                  <a:srgbClr val="FF0000"/>
+                </a:solidFill>
+              </a:rPr>
+              <a:t>docker push &lt;</a:t>
+            </a:r>
+            <a:r>
+              <a:rPr lang="en-US" dirty="0" err="1">
+                <a:solidFill>
+                  <a:srgbClr val="FF0000"/>
+                </a:solidFill>
+              </a:rPr>
+              <a:t>reponame</a:t>
+            </a:r>
+            <a:r>
+              <a:rPr lang="en-US" dirty="0">
+                <a:solidFill>
+                  <a:srgbClr val="FF0000"/>
+                </a:solidFill>
+              </a:rPr>
+              <a:t>&gt;:&lt;</a:t>
+            </a:r>
+            <a:r>
+              <a:rPr lang="en-US" dirty="0" err="1">
+                <a:solidFill>
+                  <a:srgbClr val="FF0000"/>
+                </a:solidFill>
+              </a:rPr>
+              <a:t>versionnumber</a:t>
+            </a:r>
+            <a:r>
+              <a:rPr lang="en-US" dirty="0">
+                <a:solidFill>
+                  <a:srgbClr val="FF0000"/>
+                </a:solidFill>
+              </a:rPr>
+              <a:t>&gt;</a:t>
+            </a:r>
+          </a:p>
+          <a:p>
+            <a:r>
+              <a:rPr lang="en-US" dirty="0"/>
+              <a:t>That’s it the image is now committed to </a:t>
+            </a:r>
+            <a:r>
+              <a:rPr lang="en-US" dirty="0" err="1"/>
+              <a:t>dockerhub</a:t>
+            </a:r>
+            <a:r>
+              <a:rPr lang="en-US" dirty="0"/>
+              <a:t>.</a:t>
+            </a:r>
+          </a:p>
+          <a:p>
+            <a:endParaRPr lang="en-US" dirty="0"/>
+          </a:p>
+        </p:txBody>
+      </p:sp>
+    </p:spTree>
+    <p:extLst>
+      <p:ext uri="{BB962C8B-B14F-4D97-AF65-F5344CB8AC3E}">
+        <p14:creationId xmlns:p14="http://schemas.microsoft.com/office/powerpoint/2010/main" val="2018118794"/>
+      </p:ext>
+    </p:extLst>
+  </p:cSld>
+  <p:clrMapOvr>
+    <a:masterClrMapping/>
+  </p:clrMapOvr>
+</p:sld>
+</file>
+
+<file path=ppt/slides/slide26.xml><?xml version="1.0" encoding="utf-8"?>
+<p:sld xmlns:a="http://schemas.openxmlformats.org/drawingml/2006/main" xmlns:r="http://schemas.openxmlformats.org/officeDocument/2006/relationships" xmlns:p="http://schemas.openxmlformats.org/presentationml/2006/main">
+  <p:cSld>
+    <p:spTree>
+      <p:nvGrpSpPr>
+        <p:cNvPr id="1" name=""/>
+        <p:cNvGrpSpPr/>
+        <p:nvPr/>
+      </p:nvGrpSpPr>
+      <p:grpSpPr>
+        <a:xfrm>
+          <a:off x="0" y="0"/>
+          <a:ext cx="0" cy="0"/>
+          <a:chOff x="0" y="0"/>
+          <a:chExt cx="0" cy="0"/>
+        </a:xfrm>
+      </p:grpSpPr>
+      <p:sp>
+        <p:nvSpPr>
+          <p:cNvPr id="2" name="Title 1">
+            <a:extLst>
+              <a:ext uri="{FF2B5EF4-FFF2-40B4-BE49-F238E27FC236}">
+                <a16:creationId xmlns:a16="http://schemas.microsoft.com/office/drawing/2014/main" id="{A2CF3330-5439-4365-8C47-87B4C7244F17}"/>
+              </a:ext>
+            </a:extLst>
+          </p:cNvPr>
+          <p:cNvSpPr>
+            <a:spLocks noGrp="1"/>
+          </p:cNvSpPr>
+          <p:nvPr>
+            <p:ph type="title"/>
+          </p:nvPr>
+        </p:nvSpPr>
+        <p:spPr/>
+        <p:txBody>
+          <a:bodyPr/>
+          <a:lstStyle/>
+          <a:p>
+            <a:r>
+              <a:rPr lang="en-US" dirty="0"/>
+              <a:t>Private registry –</a:t>
+            </a:r>
+          </a:p>
+        </p:txBody>
+      </p:sp>
+      <p:sp>
+        <p:nvSpPr>
+          <p:cNvPr id="3" name="Content Placeholder 2">
+            <a:extLst>
+              <a:ext uri="{FF2B5EF4-FFF2-40B4-BE49-F238E27FC236}">
+                <a16:creationId xmlns:a16="http://schemas.microsoft.com/office/drawing/2014/main" id="{B554830F-BB18-4C8A-B959-1F4FABEA1E48}"/>
+              </a:ext>
+            </a:extLst>
+          </p:cNvPr>
+          <p:cNvSpPr>
+            <a:spLocks noGrp="1"/>
+          </p:cNvSpPr>
+          <p:nvPr>
+            <p:ph idx="1"/>
+          </p:nvPr>
+        </p:nvSpPr>
+        <p:spPr/>
+        <p:txBody>
+          <a:bodyPr/>
+          <a:lstStyle/>
+          <a:p>
+            <a:r>
+              <a:rPr lang="en-US" dirty="0"/>
+              <a:t>Build a private registry :-</a:t>
+            </a:r>
+          </a:p>
+          <a:p>
+            <a:pPr marL="0" indent="0">
+              <a:buNone/>
+            </a:pPr>
+            <a:r>
+              <a:rPr lang="en-US" dirty="0"/>
+              <a:t>                 </a:t>
+            </a:r>
+            <a:r>
+              <a:rPr lang="en-US" dirty="0">
+                <a:solidFill>
+                  <a:srgbClr val="FF0000"/>
+                </a:solidFill>
+              </a:rPr>
+              <a:t>docker run –d –p 5000:5000 registry </a:t>
+            </a:r>
+            <a:r>
+              <a:rPr lang="en-US" dirty="0"/>
+              <a:t>-</a:t>
+            </a:r>
+            <a:r>
+              <a:rPr lang="en-US" dirty="0">
+                <a:sym typeface="Wingdings" panose="05000000000000000000" pitchFamily="2" charset="2"/>
+              </a:rPr>
+              <a:t> spins a registry –p means private –d means detached, port 5000 on docker host is mapped to port 5000 on the container.</a:t>
+            </a:r>
+          </a:p>
+          <a:p>
+            <a:pPr marL="0" indent="0">
+              <a:buNone/>
+            </a:pPr>
+            <a:r>
+              <a:rPr lang="en-US" dirty="0">
+                <a:sym typeface="Wingdings" panose="05000000000000000000" pitchFamily="2" charset="2"/>
+              </a:rPr>
+              <a:t>You can access this by :- docker_hostip:5000</a:t>
+            </a:r>
+          </a:p>
+          <a:p>
+            <a:pPr marL="0" indent="0">
+              <a:buNone/>
+            </a:pPr>
+            <a:r>
+              <a:rPr lang="en-US" dirty="0">
+                <a:sym typeface="Wingdings" panose="05000000000000000000" pitchFamily="2" charset="2"/>
+              </a:rPr>
+              <a:t>Using a private registry –</a:t>
+            </a:r>
+          </a:p>
+          <a:p>
+            <a:pPr marL="0" indent="0">
+              <a:buNone/>
+            </a:pPr>
+            <a:r>
+              <a:rPr lang="en-US" dirty="0">
+                <a:sym typeface="Wingdings" panose="05000000000000000000" pitchFamily="2" charset="2"/>
+              </a:rPr>
+              <a:t>Commit to a private registry – </a:t>
+            </a:r>
+          </a:p>
+          <a:p>
+            <a:pPr marL="0" indent="0">
+              <a:buNone/>
+            </a:pPr>
+            <a:r>
+              <a:rPr lang="en-US" dirty="0">
+                <a:solidFill>
+                  <a:srgbClr val="FF0000"/>
+                </a:solidFill>
+                <a:sym typeface="Wingdings" panose="05000000000000000000" pitchFamily="2" charset="2"/>
+              </a:rPr>
+              <a:t>docker tag &lt;</a:t>
+            </a:r>
+            <a:r>
+              <a:rPr lang="en-US" dirty="0" err="1">
+                <a:solidFill>
+                  <a:srgbClr val="FF0000"/>
+                </a:solidFill>
+                <a:sym typeface="Wingdings" panose="05000000000000000000" pitchFamily="2" charset="2"/>
+              </a:rPr>
+              <a:t>imageid</a:t>
+            </a:r>
+            <a:r>
+              <a:rPr lang="en-US" dirty="0">
+                <a:solidFill>
+                  <a:srgbClr val="FF0000"/>
+                </a:solidFill>
+                <a:sym typeface="Wingdings" panose="05000000000000000000" pitchFamily="2" charset="2"/>
+              </a:rPr>
+              <a:t>&gt; docker_hostip:5000/&lt;</a:t>
+            </a:r>
+            <a:r>
+              <a:rPr lang="en-US" dirty="0" err="1">
+                <a:solidFill>
+                  <a:srgbClr val="FF0000"/>
+                </a:solidFill>
+                <a:sym typeface="Wingdings" panose="05000000000000000000" pitchFamily="2" charset="2"/>
+              </a:rPr>
+              <a:t>reponame</a:t>
+            </a:r>
+            <a:r>
+              <a:rPr lang="en-US" dirty="0">
+                <a:solidFill>
+                  <a:srgbClr val="FF0000"/>
+                </a:solidFill>
+                <a:sym typeface="Wingdings" panose="05000000000000000000" pitchFamily="2" charset="2"/>
+              </a:rPr>
+              <a:t>&gt;</a:t>
+            </a:r>
+          </a:p>
+          <a:p>
+            <a:pPr marL="0" indent="0">
+              <a:buNone/>
+            </a:pPr>
+            <a:r>
+              <a:rPr lang="en-US" dirty="0">
+                <a:solidFill>
+                  <a:srgbClr val="FF0000"/>
+                </a:solidFill>
+                <a:sym typeface="Wingdings" panose="05000000000000000000" pitchFamily="2" charset="2"/>
+              </a:rPr>
+              <a:t>docker push docker_hostip:5000/&lt;</a:t>
+            </a:r>
+            <a:r>
+              <a:rPr lang="en-US" dirty="0" err="1">
+                <a:solidFill>
+                  <a:srgbClr val="FF0000"/>
+                </a:solidFill>
+                <a:sym typeface="Wingdings" panose="05000000000000000000" pitchFamily="2" charset="2"/>
+              </a:rPr>
+              <a:t>reponame</a:t>
+            </a:r>
+            <a:r>
+              <a:rPr lang="en-US" dirty="0">
+                <a:solidFill>
+                  <a:srgbClr val="FF0000"/>
+                </a:solidFill>
+                <a:sym typeface="Wingdings" panose="05000000000000000000" pitchFamily="2" charset="2"/>
+              </a:rPr>
+              <a:t>&gt;</a:t>
+            </a:r>
+          </a:p>
+          <a:p>
+            <a:pPr marL="0" indent="0">
+              <a:buNone/>
+            </a:pPr>
+            <a:endParaRPr lang="en-US" dirty="0">
+              <a:solidFill>
+                <a:srgbClr val="FF0000"/>
+              </a:solidFill>
+              <a:sym typeface="Wingdings" panose="05000000000000000000" pitchFamily="2" charset="2"/>
+            </a:endParaRPr>
+          </a:p>
+          <a:p>
+            <a:pPr marL="0" indent="0">
+              <a:buNone/>
+            </a:pPr>
+            <a:endParaRPr lang="en-US" dirty="0">
+              <a:sym typeface="Wingdings" panose="05000000000000000000" pitchFamily="2" charset="2"/>
+            </a:endParaRPr>
+          </a:p>
+          <a:p>
+            <a:pPr marL="0" indent="0">
+              <a:buNone/>
+            </a:pPr>
+            <a:endParaRPr lang="en-US" dirty="0"/>
+          </a:p>
+        </p:txBody>
+      </p:sp>
+    </p:spTree>
+    <p:extLst>
+      <p:ext uri="{BB962C8B-B14F-4D97-AF65-F5344CB8AC3E}">
+        <p14:creationId xmlns:p14="http://schemas.microsoft.com/office/powerpoint/2010/main" val="1401829633"/>
+      </p:ext>
+    </p:extLst>
+  </p:cSld>
+  <p:clrMapOvr>
+    <a:masterClrMapping/>
+  </p:clrMapOvr>
+</p:sld>
+</file>
+
+<file path=ppt/slides/slide27.xml><?xml version="1.0" encoding="utf-8"?>
+<p:sld xmlns:a="http://schemas.openxmlformats.org/drawingml/2006/main" xmlns:r="http://schemas.openxmlformats.org/officeDocument/2006/relationships" xmlns:p="http://schemas.openxmlformats.org/presentationml/2006/main">
+  <p:cSld>
+    <p:spTree>
+      <p:nvGrpSpPr>
+        <p:cNvPr id="1" name=""/>
+        <p:cNvGrpSpPr/>
+        <p:nvPr/>
+      </p:nvGrpSpPr>
+      <p:grpSpPr>
+        <a:xfrm>
+          <a:off x="0" y="0"/>
+          <a:ext cx="0" cy="0"/>
+          <a:chOff x="0" y="0"/>
+          <a:chExt cx="0" cy="0"/>
+        </a:xfrm>
+      </p:grpSpPr>
+      <p:sp>
+        <p:nvSpPr>
+          <p:cNvPr id="3" name="Content Placeholder 2">
+            <a:extLst>
+              <a:ext uri="{FF2B5EF4-FFF2-40B4-BE49-F238E27FC236}">
+                <a16:creationId xmlns:a16="http://schemas.microsoft.com/office/drawing/2014/main" id="{AEE70128-805E-4E66-86D3-C558C0FCD3AC}"/>
+              </a:ext>
+            </a:extLst>
+          </p:cNvPr>
+          <p:cNvSpPr>
+            <a:spLocks noGrp="1"/>
+          </p:cNvSpPr>
+          <p:nvPr>
+            <p:ph idx="1"/>
+          </p:nvPr>
+        </p:nvSpPr>
+        <p:spPr>
+          <a:xfrm>
+            <a:off x="838200" y="407773"/>
+            <a:ext cx="10515600" cy="5769190"/>
+          </a:xfrm>
+        </p:spPr>
+        <p:txBody>
+          <a:bodyPr/>
+          <a:lstStyle/>
+          <a:p>
+            <a:r>
+              <a:rPr lang="en-US" dirty="0"/>
+              <a:t>Pulling a image from private registry –</a:t>
+            </a:r>
+          </a:p>
+          <a:p>
+            <a:r>
+              <a:rPr lang="en-US" dirty="0"/>
+              <a:t>docker run –d </a:t>
+            </a:r>
+            <a:r>
+              <a:rPr lang="en-US" dirty="0">
+                <a:solidFill>
+                  <a:srgbClr val="FF0000"/>
+                </a:solidFill>
+                <a:sym typeface="Wingdings" panose="05000000000000000000" pitchFamily="2" charset="2"/>
+              </a:rPr>
+              <a:t>docker_hostip:5000/&lt;</a:t>
+            </a:r>
+            <a:r>
+              <a:rPr lang="en-US" dirty="0" err="1">
+                <a:solidFill>
+                  <a:srgbClr val="FF0000"/>
+                </a:solidFill>
+                <a:sym typeface="Wingdings" panose="05000000000000000000" pitchFamily="2" charset="2"/>
+              </a:rPr>
+              <a:t>reponame</a:t>
+            </a:r>
+            <a:r>
+              <a:rPr lang="en-US" dirty="0">
+                <a:solidFill>
+                  <a:srgbClr val="FF0000"/>
+                </a:solidFill>
+                <a:sym typeface="Wingdings" panose="05000000000000000000" pitchFamily="2" charset="2"/>
+              </a:rPr>
+              <a:t>&gt;:&lt;</a:t>
+            </a:r>
+            <a:r>
+              <a:rPr lang="en-US" dirty="0" err="1">
+                <a:solidFill>
+                  <a:srgbClr val="FF0000"/>
+                </a:solidFill>
+                <a:sym typeface="Wingdings" panose="05000000000000000000" pitchFamily="2" charset="2"/>
+              </a:rPr>
+              <a:t>versionno</a:t>
+            </a:r>
+            <a:r>
+              <a:rPr lang="en-US" dirty="0">
+                <a:solidFill>
+                  <a:srgbClr val="FF0000"/>
+                </a:solidFill>
+                <a:sym typeface="Wingdings" panose="05000000000000000000" pitchFamily="2" charset="2"/>
+              </a:rPr>
+              <a:t>&gt;</a:t>
+            </a:r>
+          </a:p>
+          <a:p>
+            <a:pPr marL="0" indent="0">
+              <a:buNone/>
+            </a:pPr>
+            <a:endParaRPr lang="en-US" dirty="0">
+              <a:solidFill>
+                <a:srgbClr val="FF0000"/>
+              </a:solidFill>
+              <a:sym typeface="Wingdings" panose="05000000000000000000" pitchFamily="2" charset="2"/>
+            </a:endParaRPr>
+          </a:p>
+        </p:txBody>
+      </p:sp>
+    </p:spTree>
+    <p:extLst>
+      <p:ext uri="{BB962C8B-B14F-4D97-AF65-F5344CB8AC3E}">
+        <p14:creationId xmlns:p14="http://schemas.microsoft.com/office/powerpoint/2010/main" val="2552398434"/>
+      </p:ext>
+    </p:extLst>
+  </p:cSld>
+  <p:clrMapOvr>
+    <a:masterClrMapping/>
+  </p:clrMapOvr>
+</p:sld>
+</file>
+
+<file path=ppt/slides/slide28.xml><?xml version="1.0" encoding="utf-8"?>
+<p:sld xmlns:a="http://schemas.openxmlformats.org/drawingml/2006/main" xmlns:r="http://schemas.openxmlformats.org/officeDocument/2006/relationships" xmlns:p="http://schemas.openxmlformats.org/presentationml/2006/main">
+  <p:cSld>
+    <p:spTree>
+      <p:nvGrpSpPr>
+        <p:cNvPr id="1" name=""/>
+        <p:cNvGrpSpPr/>
+        <p:nvPr/>
+      </p:nvGrpSpPr>
+      <p:grpSpPr>
+        <a:xfrm>
+          <a:off x="0" y="0"/>
+          <a:ext cx="0" cy="0"/>
+          <a:chOff x="0" y="0"/>
+          <a:chExt cx="0" cy="0"/>
+        </a:xfrm>
+      </p:grpSpPr>
+      <p:sp>
+        <p:nvSpPr>
+          <p:cNvPr id="2" name="Title 1">
+            <a:extLst>
+              <a:ext uri="{FF2B5EF4-FFF2-40B4-BE49-F238E27FC236}">
                 <a16:creationId xmlns:a16="http://schemas.microsoft.com/office/drawing/2014/main" id="{4B6A4DD0-1B7A-45CA-916F-59F707E3E070}"/>
               </a:ext>
             </a:extLst>
@@ -5942,7 +6673,7 @@
 </p:sld>
 </file>
 
-<file path=ppt/slides/slide23.xml><?xml version="1.0" encoding="utf-8"?>
+<file path=ppt/slides/slide29.xml><?xml version="1.0" encoding="utf-8"?>
 <p:sld xmlns:a="http://schemas.openxmlformats.org/drawingml/2006/main" xmlns:r="http://schemas.openxmlformats.org/officeDocument/2006/relationships" xmlns:p="http://schemas.openxmlformats.org/presentationml/2006/main">
   <p:cSld>
     <p:spTree>
@@ -6043,7 +6774,7 @@
 </p:sld>
 </file>
 
-<file path=ppt/slides/slide24.xml><?xml version="1.0" encoding="utf-8"?>
+<file path=ppt/slides/slide3.xml><?xml version="1.0" encoding="utf-8"?>
 <p:sld xmlns:a="http://schemas.openxmlformats.org/drawingml/2006/main" xmlns:r="http://schemas.openxmlformats.org/officeDocument/2006/relationships" xmlns:p="http://schemas.openxmlformats.org/presentationml/2006/main">
   <p:cSld>
     <p:spTree>
@@ -6065,7 +6796,7 @@
           <p:cNvPr id="2" name="Title 1">
             <a:extLst>
               <a:ext uri="{FF2B5EF4-FFF2-40B4-BE49-F238E27FC236}">
-                <a16:creationId xmlns:a16="http://schemas.microsoft.com/office/drawing/2014/main" id="{4084BFB9-57B5-46A4-84BE-280EB1C91771}"/>
+                <a16:creationId xmlns:a16="http://schemas.microsoft.com/office/drawing/2014/main" id="{1EEB0DBD-8946-432B-A5D0-12715937A5C8}"/>
               </a:ext>
             </a:extLst>
           </p:cNvPr>
@@ -6083,8 +6814,12 @@
           <a:p>
             <a:r>
               <a:rPr lang="en-US" dirty="0"/>
-              <a:t>Networking configuration Files-</a:t>
-            </a:r>
+              <a:t>Installation on ec2 -</a:t>
+            </a:r>
+            <a:br>
+              <a:rPr lang="en-US" dirty="0"/>
+            </a:br>
+            <a:endParaRPr lang="en-US" dirty="0"/>
           </a:p>
         </p:txBody>
       </p:sp>
@@ -6093,7 +6828,7 @@
           <p:cNvPr id="3" name="Content Placeholder 2">
             <a:extLst>
               <a:ext uri="{FF2B5EF4-FFF2-40B4-BE49-F238E27FC236}">
-                <a16:creationId xmlns:a16="http://schemas.microsoft.com/office/drawing/2014/main" id="{0DEF63E1-84DB-43A5-908C-D1C9AC007727}"/>
+                <a16:creationId xmlns:a16="http://schemas.microsoft.com/office/drawing/2014/main" id="{DBA7837F-C1A6-4E5B-8220-758935A2E9DC}"/>
               </a:ext>
             </a:extLst>
           </p:cNvPr>
@@ -6111,170 +6846,90 @@
           <a:p>
             <a:r>
               <a:rPr lang="en-US" dirty="0"/>
-              <a:t>They are in </a:t>
-            </a:r>
-            <a:r>
-              <a:rPr lang="en-US" dirty="0">
-                <a:sym typeface="Wingdings" panose="05000000000000000000" pitchFamily="2" charset="2"/>
-              </a:rPr>
-              <a:t> /</a:t>
-            </a:r>
-            <a:r>
-              <a:rPr lang="en-US" dirty="0" err="1">
-                <a:sym typeface="Wingdings" panose="05000000000000000000" pitchFamily="2" charset="2"/>
-              </a:rPr>
-              <a:t>var</a:t>
-            </a:r>
-            <a:r>
-              <a:rPr lang="en-US" dirty="0">
-                <a:sym typeface="Wingdings" panose="05000000000000000000" pitchFamily="2" charset="2"/>
-              </a:rPr>
-              <a:t>/lib/docker/containers/&lt;container64bitid&gt;  hosts and </a:t>
-            </a:r>
-            <a:r>
-              <a:rPr lang="en-US" dirty="0" err="1">
-                <a:sym typeface="Wingdings" panose="05000000000000000000" pitchFamily="2" charset="2"/>
-              </a:rPr>
-              <a:t>resolv.conf</a:t>
-            </a:r>
-            <a:r>
-              <a:rPr lang="en-US" dirty="0">
-                <a:sym typeface="Wingdings" panose="05000000000000000000" pitchFamily="2" charset="2"/>
-              </a:rPr>
-              <a:t> files are the network related files.</a:t>
-            </a:r>
-          </a:p>
-          <a:p>
-            <a:r>
-              <a:rPr lang="en-US" dirty="0">
-                <a:sym typeface="Wingdings" panose="05000000000000000000" pitchFamily="2" charset="2"/>
-              </a:rPr>
-              <a:t>To see these </a:t>
-            </a:r>
-            <a:r>
-              <a:rPr lang="en-US" dirty="0" err="1">
-                <a:sym typeface="Wingdings" panose="05000000000000000000" pitchFamily="2" charset="2"/>
-              </a:rPr>
-              <a:t>conf</a:t>
-            </a:r>
-            <a:r>
-              <a:rPr lang="en-US" dirty="0">
-                <a:sym typeface="Wingdings" panose="05000000000000000000" pitchFamily="2" charset="2"/>
-              </a:rPr>
-              <a:t> files of docker host go to /</a:t>
-            </a:r>
-            <a:r>
-              <a:rPr lang="en-US" dirty="0" err="1">
-                <a:sym typeface="Wingdings" panose="05000000000000000000" pitchFamily="2" charset="2"/>
-              </a:rPr>
-              <a:t>etc</a:t>
-            </a:r>
-            <a:r>
-              <a:rPr lang="en-US" dirty="0">
-                <a:sym typeface="Wingdings" panose="05000000000000000000" pitchFamily="2" charset="2"/>
-              </a:rPr>
-              <a:t>/</a:t>
-            </a:r>
-            <a:r>
-              <a:rPr lang="en-US" dirty="0" err="1">
-                <a:sym typeface="Wingdings" panose="05000000000000000000" pitchFamily="2" charset="2"/>
-              </a:rPr>
-              <a:t>resolv.conf</a:t>
-            </a:r>
-            <a:r>
-              <a:rPr lang="en-US" dirty="0">
-                <a:sym typeface="Wingdings" panose="05000000000000000000" pitchFamily="2" charset="2"/>
-              </a:rPr>
-              <a:t> and hosts file.</a:t>
-            </a:r>
-          </a:p>
-          <a:p>
-            <a:r>
-              <a:rPr lang="en-US" dirty="0">
-                <a:sym typeface="Wingdings" panose="05000000000000000000" pitchFamily="2" charset="2"/>
-              </a:rPr>
-              <a:t>If you want to specify the </a:t>
-            </a:r>
-            <a:r>
-              <a:rPr lang="en-US" dirty="0" err="1">
-                <a:sym typeface="Wingdings" panose="05000000000000000000" pitchFamily="2" charset="2"/>
-              </a:rPr>
-              <a:t>dns</a:t>
-            </a:r>
-            <a:r>
-              <a:rPr lang="en-US" dirty="0">
-                <a:sym typeface="Wingdings" panose="05000000000000000000" pitchFamily="2" charset="2"/>
-              </a:rPr>
-              <a:t> name while spinning up a container –</a:t>
-            </a:r>
-          </a:p>
-          <a:p>
-            <a:r>
-              <a:rPr lang="en-US" dirty="0">
-                <a:sym typeface="Wingdings" panose="05000000000000000000" pitchFamily="2" charset="2"/>
-              </a:rPr>
-              <a:t> </a:t>
-            </a:r>
-            <a:r>
-              <a:rPr lang="en-US" dirty="0">
-                <a:solidFill>
-                  <a:srgbClr val="C00000"/>
-                </a:solidFill>
-                <a:sym typeface="Wingdings" panose="05000000000000000000" pitchFamily="2" charset="2"/>
-              </a:rPr>
-              <a:t>docker run –</a:t>
-            </a:r>
-            <a:r>
-              <a:rPr lang="en-US" dirty="0" err="1">
-                <a:solidFill>
-                  <a:srgbClr val="C00000"/>
-                </a:solidFill>
-                <a:sym typeface="Wingdings" panose="05000000000000000000" pitchFamily="2" charset="2"/>
-              </a:rPr>
-              <a:t>dns</a:t>
-            </a:r>
-            <a:r>
-              <a:rPr lang="en-US" dirty="0">
-                <a:solidFill>
-                  <a:srgbClr val="C00000"/>
-                </a:solidFill>
-                <a:sym typeface="Wingdings" panose="05000000000000000000" pitchFamily="2" charset="2"/>
-              </a:rPr>
-              <a:t>=8.8.4.4 &lt;</a:t>
-            </a:r>
-            <a:r>
-              <a:rPr lang="en-US" dirty="0" err="1">
-                <a:solidFill>
-                  <a:srgbClr val="C00000"/>
-                </a:solidFill>
-                <a:sym typeface="Wingdings" panose="05000000000000000000" pitchFamily="2" charset="2"/>
-              </a:rPr>
-              <a:t>image_name</a:t>
-            </a:r>
-            <a:r>
-              <a:rPr lang="en-US" dirty="0">
-                <a:solidFill>
-                  <a:srgbClr val="C00000"/>
-                </a:solidFill>
-                <a:sym typeface="Wingdings" panose="05000000000000000000" pitchFamily="2" charset="2"/>
-              </a:rPr>
-              <a:t>&gt;</a:t>
-            </a:r>
-          </a:p>
-          <a:p>
-            <a:endParaRPr lang="en-US" dirty="0">
-              <a:solidFill>
-                <a:srgbClr val="C00000"/>
-              </a:solidFill>
-              <a:sym typeface="Wingdings" panose="05000000000000000000" pitchFamily="2" charset="2"/>
-            </a:endParaRPr>
+              <a:t>To install docker on EC2 -</a:t>
+            </a:r>
+          </a:p>
+          <a:p>
+            <a:pPr marL="0" indent="0" fontAlgn="ctr">
+              <a:buNone/>
+            </a:pPr>
+            <a:r>
+              <a:rPr lang="en-US" dirty="0"/>
+              <a:t>-&gt; Update the packages on your instance</a:t>
+            </a:r>
+            <a:br>
+              <a:rPr lang="en-US" dirty="0"/>
+            </a:br>
+            <a:r>
+              <a:rPr lang="en-US" dirty="0"/>
+              <a:t>[ec2-user ~]$ </a:t>
+            </a:r>
+            <a:r>
+              <a:rPr lang="en-US" dirty="0" err="1"/>
+              <a:t>sudo</a:t>
+            </a:r>
+            <a:r>
+              <a:rPr lang="en-US" dirty="0"/>
+              <a:t> yum update -y</a:t>
+            </a:r>
+          </a:p>
+          <a:p>
+            <a:pPr marL="0" indent="0" fontAlgn="ctr">
+              <a:buNone/>
+            </a:pPr>
+            <a:r>
+              <a:rPr lang="en-US" dirty="0"/>
+              <a:t>-&gt; Install Docker</a:t>
+            </a:r>
+            <a:br>
+              <a:rPr lang="en-US" dirty="0"/>
+            </a:br>
+            <a:r>
+              <a:rPr lang="en-US" dirty="0"/>
+              <a:t>[ec2-user ~]$ </a:t>
+            </a:r>
+            <a:r>
+              <a:rPr lang="en-US" dirty="0" err="1"/>
+              <a:t>sudo</a:t>
+            </a:r>
+            <a:r>
+              <a:rPr lang="en-US" dirty="0"/>
+              <a:t> yum install docker -y</a:t>
+            </a:r>
+          </a:p>
+          <a:p>
+            <a:pPr marL="0" indent="0" fontAlgn="ctr">
+              <a:buNone/>
+            </a:pPr>
+            <a:r>
+              <a:rPr lang="en-US" dirty="0"/>
+              <a:t>-&gt; Start the Docker Service</a:t>
+            </a:r>
+            <a:br>
+              <a:rPr lang="en-US" dirty="0"/>
+            </a:br>
+            <a:r>
+              <a:rPr lang="en-US" dirty="0"/>
+              <a:t>[ec2-user ~]$ </a:t>
+            </a:r>
+            <a:r>
+              <a:rPr lang="en-US" dirty="0" err="1"/>
+              <a:t>sudo</a:t>
+            </a:r>
+            <a:r>
+              <a:rPr lang="en-US" dirty="0"/>
+              <a:t> service docker start</a:t>
+            </a:r>
+          </a:p>
+          <a:p>
+            <a:endParaRPr lang="en-US" dirty="0"/>
           </a:p>
         </p:txBody>
       </p:sp>
     </p:spTree>
     <p:extLst>
       <p:ext uri="{BB962C8B-B14F-4D97-AF65-F5344CB8AC3E}">
-        <p14:creationId xmlns:p14="http://schemas.microsoft.com/office/powerpoint/2010/main" val="3300203671"/>
+        <p14:creationId xmlns:p14="http://schemas.microsoft.com/office/powerpoint/2010/main" val="1155773211"/>
       </p:ext>
     </p:extLst>
   </p:cSld>
@@ -6284,7 +6939,7 @@
 </p:sld>
 </file>
 
-<file path=ppt/slides/slide25.xml><?xml version="1.0" encoding="utf-8"?>
+<file path=ppt/slides/slide30.xml><?xml version="1.0" encoding="utf-8"?>
 <p:sld xmlns:a="http://schemas.openxmlformats.org/drawingml/2006/main" xmlns:r="http://schemas.openxmlformats.org/officeDocument/2006/relationships" xmlns:p="http://schemas.openxmlformats.org/presentationml/2006/main">
   <p:cSld>
     <p:spTree>
@@ -6306,6 +6961,247 @@
           <p:cNvPr id="2" name="Title 1">
             <a:extLst>
               <a:ext uri="{FF2B5EF4-FFF2-40B4-BE49-F238E27FC236}">
+                <a16:creationId xmlns:a16="http://schemas.microsoft.com/office/drawing/2014/main" id="{4084BFB9-57B5-46A4-84BE-280EB1C91771}"/>
+              </a:ext>
+            </a:extLst>
+          </p:cNvPr>
+          <p:cNvSpPr>
+            <a:spLocks noGrp="1"/>
+          </p:cNvSpPr>
+          <p:nvPr>
+            <p:ph type="title"/>
+          </p:nvPr>
+        </p:nvSpPr>
+        <p:spPr/>
+        <p:txBody>
+          <a:bodyPr/>
+          <a:lstStyle/>
+          <a:p>
+            <a:r>
+              <a:rPr lang="en-US" dirty="0"/>
+              <a:t>Networking configuration Files-</a:t>
+            </a:r>
+          </a:p>
+        </p:txBody>
+      </p:sp>
+      <p:sp>
+        <p:nvSpPr>
+          <p:cNvPr id="3" name="Content Placeholder 2">
+            <a:extLst>
+              <a:ext uri="{FF2B5EF4-FFF2-40B4-BE49-F238E27FC236}">
+                <a16:creationId xmlns:a16="http://schemas.microsoft.com/office/drawing/2014/main" id="{0DEF63E1-84DB-43A5-908C-D1C9AC007727}"/>
+              </a:ext>
+            </a:extLst>
+          </p:cNvPr>
+          <p:cNvSpPr>
+            <a:spLocks noGrp="1"/>
+          </p:cNvSpPr>
+          <p:nvPr>
+            <p:ph idx="1"/>
+          </p:nvPr>
+        </p:nvSpPr>
+        <p:spPr/>
+        <p:txBody>
+          <a:bodyPr/>
+          <a:lstStyle/>
+          <a:p>
+            <a:r>
+              <a:rPr lang="en-US" dirty="0"/>
+              <a:t>They are in </a:t>
+            </a:r>
+            <a:r>
+              <a:rPr lang="en-US" dirty="0">
+                <a:sym typeface="Wingdings" panose="05000000000000000000" pitchFamily="2" charset="2"/>
+              </a:rPr>
+              <a:t> /</a:t>
+            </a:r>
+            <a:r>
+              <a:rPr lang="en-US" dirty="0" err="1">
+                <a:sym typeface="Wingdings" panose="05000000000000000000" pitchFamily="2" charset="2"/>
+              </a:rPr>
+              <a:t>var</a:t>
+            </a:r>
+            <a:r>
+              <a:rPr lang="en-US" dirty="0">
+                <a:sym typeface="Wingdings" panose="05000000000000000000" pitchFamily="2" charset="2"/>
+              </a:rPr>
+              <a:t>/lib/docker/containers/&lt;container64bitid&gt;  hosts and </a:t>
+            </a:r>
+            <a:r>
+              <a:rPr lang="en-US" dirty="0" err="1">
+                <a:sym typeface="Wingdings" panose="05000000000000000000" pitchFamily="2" charset="2"/>
+              </a:rPr>
+              <a:t>resolv.conf</a:t>
+            </a:r>
+            <a:r>
+              <a:rPr lang="en-US" dirty="0">
+                <a:sym typeface="Wingdings" panose="05000000000000000000" pitchFamily="2" charset="2"/>
+              </a:rPr>
+              <a:t> files are the network related files.</a:t>
+            </a:r>
+          </a:p>
+          <a:p>
+            <a:r>
+              <a:rPr lang="en-US" dirty="0">
+                <a:sym typeface="Wingdings" panose="05000000000000000000" pitchFamily="2" charset="2"/>
+              </a:rPr>
+              <a:t>To see these </a:t>
+            </a:r>
+            <a:r>
+              <a:rPr lang="en-US" dirty="0" err="1">
+                <a:sym typeface="Wingdings" panose="05000000000000000000" pitchFamily="2" charset="2"/>
+              </a:rPr>
+              <a:t>conf</a:t>
+            </a:r>
+            <a:r>
+              <a:rPr lang="en-US" dirty="0">
+                <a:sym typeface="Wingdings" panose="05000000000000000000" pitchFamily="2" charset="2"/>
+              </a:rPr>
+              <a:t> files of docker host go to /</a:t>
+            </a:r>
+            <a:r>
+              <a:rPr lang="en-US" dirty="0" err="1">
+                <a:sym typeface="Wingdings" panose="05000000000000000000" pitchFamily="2" charset="2"/>
+              </a:rPr>
+              <a:t>etc</a:t>
+            </a:r>
+            <a:r>
+              <a:rPr lang="en-US" dirty="0">
+                <a:sym typeface="Wingdings" panose="05000000000000000000" pitchFamily="2" charset="2"/>
+              </a:rPr>
+              <a:t>/</a:t>
+            </a:r>
+            <a:r>
+              <a:rPr lang="en-US" dirty="0" err="1">
+                <a:sym typeface="Wingdings" panose="05000000000000000000" pitchFamily="2" charset="2"/>
+              </a:rPr>
+              <a:t>resolv.conf</a:t>
+            </a:r>
+            <a:r>
+              <a:rPr lang="en-US" dirty="0">
+                <a:sym typeface="Wingdings" panose="05000000000000000000" pitchFamily="2" charset="2"/>
+              </a:rPr>
+              <a:t> and hosts file.</a:t>
+            </a:r>
+          </a:p>
+          <a:p>
+            <a:r>
+              <a:rPr lang="en-US" dirty="0">
+                <a:sym typeface="Wingdings" panose="05000000000000000000" pitchFamily="2" charset="2"/>
+              </a:rPr>
+              <a:t>If you want to specify the </a:t>
+            </a:r>
+            <a:r>
+              <a:rPr lang="en-US" dirty="0" err="1">
+                <a:sym typeface="Wingdings" panose="05000000000000000000" pitchFamily="2" charset="2"/>
+              </a:rPr>
+              <a:t>dns</a:t>
+            </a:r>
+            <a:r>
+              <a:rPr lang="en-US" dirty="0">
+                <a:sym typeface="Wingdings" panose="05000000000000000000" pitchFamily="2" charset="2"/>
+              </a:rPr>
+              <a:t> name while spinning up a container –</a:t>
+            </a:r>
+          </a:p>
+          <a:p>
+            <a:r>
+              <a:rPr lang="en-US" dirty="0">
+                <a:sym typeface="Wingdings" panose="05000000000000000000" pitchFamily="2" charset="2"/>
+              </a:rPr>
+              <a:t> </a:t>
+            </a:r>
+            <a:r>
+              <a:rPr lang="en-US" dirty="0">
+                <a:solidFill>
+                  <a:srgbClr val="C00000"/>
+                </a:solidFill>
+                <a:sym typeface="Wingdings" panose="05000000000000000000" pitchFamily="2" charset="2"/>
+              </a:rPr>
+              <a:t>docker run –</a:t>
+            </a:r>
+            <a:r>
+              <a:rPr lang="en-US" dirty="0" err="1">
+                <a:solidFill>
+                  <a:srgbClr val="C00000"/>
+                </a:solidFill>
+                <a:sym typeface="Wingdings" panose="05000000000000000000" pitchFamily="2" charset="2"/>
+              </a:rPr>
+              <a:t>dns</a:t>
+            </a:r>
+            <a:r>
+              <a:rPr lang="en-US" dirty="0">
+                <a:solidFill>
+                  <a:srgbClr val="C00000"/>
+                </a:solidFill>
+                <a:sym typeface="Wingdings" panose="05000000000000000000" pitchFamily="2" charset="2"/>
+              </a:rPr>
+              <a:t>=8.8.4.4 &lt;</a:t>
+            </a:r>
+            <a:r>
+              <a:rPr lang="en-US" dirty="0" err="1">
+                <a:solidFill>
+                  <a:srgbClr val="C00000"/>
+                </a:solidFill>
+                <a:sym typeface="Wingdings" panose="05000000000000000000" pitchFamily="2" charset="2"/>
+              </a:rPr>
+              <a:t>image_name</a:t>
+            </a:r>
+            <a:r>
+              <a:rPr lang="en-US" dirty="0">
+                <a:solidFill>
+                  <a:srgbClr val="C00000"/>
+                </a:solidFill>
+                <a:sym typeface="Wingdings" panose="05000000000000000000" pitchFamily="2" charset="2"/>
+              </a:rPr>
+              <a:t>&gt;</a:t>
+            </a:r>
+          </a:p>
+          <a:p>
+            <a:endParaRPr lang="en-US" dirty="0">
+              <a:solidFill>
+                <a:srgbClr val="C00000"/>
+              </a:solidFill>
+              <a:sym typeface="Wingdings" panose="05000000000000000000" pitchFamily="2" charset="2"/>
+            </a:endParaRPr>
+          </a:p>
+        </p:txBody>
+      </p:sp>
+    </p:spTree>
+    <p:extLst>
+      <p:ext uri="{BB962C8B-B14F-4D97-AF65-F5344CB8AC3E}">
+        <p14:creationId xmlns:p14="http://schemas.microsoft.com/office/powerpoint/2010/main" val="3300203671"/>
+      </p:ext>
+    </p:extLst>
+  </p:cSld>
+  <p:clrMapOvr>
+    <a:masterClrMapping/>
+  </p:clrMapOvr>
+</p:sld>
+</file>
+
+<file path=ppt/slides/slide31.xml><?xml version="1.0" encoding="utf-8"?>
+<p:sld xmlns:a="http://schemas.openxmlformats.org/drawingml/2006/main" xmlns:r="http://schemas.openxmlformats.org/officeDocument/2006/relationships" xmlns:p="http://schemas.openxmlformats.org/presentationml/2006/main">
+  <p:cSld>
+    <p:spTree>
+      <p:nvGrpSpPr>
+        <p:cNvPr id="1" name=""/>
+        <p:cNvGrpSpPr/>
+        <p:nvPr/>
+      </p:nvGrpSpPr>
+      <p:grpSpPr>
+        <a:xfrm>
+          <a:off x="0" y="0"/>
+          <a:ext cx="0" cy="0"/>
+          <a:chOff x="0" y="0"/>
+          <a:chExt cx="0" cy="0"/>
+        </a:xfrm>
+      </p:grpSpPr>
+      <p:sp>
+        <p:nvSpPr>
+          <p:cNvPr id="2" name="Title 1">
+            <a:extLst>
+              <a:ext uri="{FF2B5EF4-FFF2-40B4-BE49-F238E27FC236}">
                 <a16:creationId xmlns:a16="http://schemas.microsoft.com/office/drawing/2014/main" id="{E7595CF0-8590-4A46-8CF4-534687372391}"/>
               </a:ext>
             </a:extLst>
@@ -6455,7 +7351,7 @@
 </p:sld>
 </file>
 
-<file path=ppt/slides/slide26.xml><?xml version="1.0" encoding="utf-8"?>
+<file path=ppt/slides/slide32.xml><?xml version="1.0" encoding="utf-8"?>
 <p:sld xmlns:a="http://schemas.openxmlformats.org/drawingml/2006/main" xmlns:r="http://schemas.openxmlformats.org/officeDocument/2006/relationships" xmlns:p="http://schemas.openxmlformats.org/presentationml/2006/main">
   <p:cSld>
     <p:spTree>
@@ -6574,7 +7470,7 @@
 </p:sld>
 </file>
 
-<file path=ppt/slides/slide27.xml><?xml version="1.0" encoding="utf-8"?>
+<file path=ppt/slides/slide33.xml><?xml version="1.0" encoding="utf-8"?>
 <p:sld xmlns:a="http://schemas.openxmlformats.org/drawingml/2006/main" xmlns:r="http://schemas.openxmlformats.org/officeDocument/2006/relationships" xmlns:p="http://schemas.openxmlformats.org/presentationml/2006/main">
   <p:cSld>
     <p:spTree>
@@ -6835,7 +7731,7 @@
 </p:sld>
 </file>
 
-<file path=ppt/slides/slide28.xml><?xml version="1.0" encoding="utf-8"?>
+<file path=ppt/slides/slide34.xml><?xml version="1.0" encoding="utf-8"?>
 <p:sld xmlns:a="http://schemas.openxmlformats.org/drawingml/2006/main" xmlns:r="http://schemas.openxmlformats.org/officeDocument/2006/relationships" xmlns:p="http://schemas.openxmlformats.org/presentationml/2006/main">
   <p:cSld>
     <p:spTree>
@@ -7068,7 +7964,7 @@
 </p:sld>
 </file>
 
-<file path=ppt/slides/slide29.xml><?xml version="1.0" encoding="utf-8"?>
+<file path=ppt/slides/slide35.xml><?xml version="1.0" encoding="utf-8"?>
 <p:sld xmlns:a="http://schemas.openxmlformats.org/drawingml/2006/main" xmlns:r="http://schemas.openxmlformats.org/officeDocument/2006/relationships" xmlns:p="http://schemas.openxmlformats.org/presentationml/2006/main">
   <p:cSld>
     <p:spTree>
@@ -7363,172 +8259,7 @@
 </p:sld>
 </file>
 
-<file path=ppt/slides/slide3.xml><?xml version="1.0" encoding="utf-8"?>
-<p:sld xmlns:a="http://schemas.openxmlformats.org/drawingml/2006/main" xmlns:r="http://schemas.openxmlformats.org/officeDocument/2006/relationships" xmlns:p="http://schemas.openxmlformats.org/presentationml/2006/main">
-  <p:cSld>
-    <p:spTree>
-      <p:nvGrpSpPr>
-        <p:cNvPr id="1" name=""/>
-        <p:cNvGrpSpPr/>
-        <p:nvPr/>
-      </p:nvGrpSpPr>
-      <p:grpSpPr>
-        <a:xfrm>
-          <a:off x="0" y="0"/>
-          <a:ext cx="0" cy="0"/>
-          <a:chOff x="0" y="0"/>
-          <a:chExt cx="0" cy="0"/>
-        </a:xfrm>
-      </p:grpSpPr>
-      <p:sp>
-        <p:nvSpPr>
-          <p:cNvPr id="2" name="Title 1">
-            <a:extLst>
-              <a:ext uri="{FF2B5EF4-FFF2-40B4-BE49-F238E27FC236}">
-                <a16:creationId xmlns:a16="http://schemas.microsoft.com/office/drawing/2014/main" id="{1EEB0DBD-8946-432B-A5D0-12715937A5C8}"/>
-              </a:ext>
-            </a:extLst>
-          </p:cNvPr>
-          <p:cNvSpPr>
-            <a:spLocks noGrp="1"/>
-          </p:cNvSpPr>
-          <p:nvPr>
-            <p:ph type="title"/>
-          </p:nvPr>
-        </p:nvSpPr>
-        <p:spPr/>
-        <p:txBody>
-          <a:bodyPr/>
-          <a:lstStyle/>
-          <a:p>
-            <a:r>
-              <a:rPr lang="en-US" dirty="0"/>
-              <a:t>Installation on ec2 -</a:t>
-            </a:r>
-            <a:br>
-              <a:rPr lang="en-US" dirty="0"/>
-            </a:br>
-            <a:endParaRPr lang="en-US" dirty="0"/>
-          </a:p>
-        </p:txBody>
-      </p:sp>
-      <p:sp>
-        <p:nvSpPr>
-          <p:cNvPr id="3" name="Content Placeholder 2">
-            <a:extLst>
-              <a:ext uri="{FF2B5EF4-FFF2-40B4-BE49-F238E27FC236}">
-                <a16:creationId xmlns:a16="http://schemas.microsoft.com/office/drawing/2014/main" id="{DBA7837F-C1A6-4E5B-8220-758935A2E9DC}"/>
-              </a:ext>
-            </a:extLst>
-          </p:cNvPr>
-          <p:cNvSpPr>
-            <a:spLocks noGrp="1"/>
-          </p:cNvSpPr>
-          <p:nvPr>
-            <p:ph idx="1"/>
-          </p:nvPr>
-        </p:nvSpPr>
-        <p:spPr/>
-        <p:txBody>
-          <a:bodyPr/>
-          <a:lstStyle/>
-          <a:p>
-            <a:r>
-              <a:rPr lang="en-US" dirty="0"/>
-              <a:t>To install docker on EC2 -</a:t>
-            </a:r>
-          </a:p>
-          <a:p>
-            <a:pPr marL="0" indent="0" fontAlgn="ctr">
-              <a:buNone/>
-            </a:pPr>
-            <a:r>
-              <a:rPr lang="en-US" dirty="0"/>
-              <a:t>-&gt; Update the packages on your instance</a:t>
-            </a:r>
-            <a:br>
-              <a:rPr lang="en-US" dirty="0"/>
-            </a:br>
-            <a:r>
-              <a:rPr lang="en-US" dirty="0"/>
-              <a:t>[ec2-user ~]$ </a:t>
-            </a:r>
-            <a:r>
-              <a:rPr lang="en-US" dirty="0" err="1"/>
-              <a:t>sudo</a:t>
-            </a:r>
-            <a:r>
-              <a:rPr lang="en-US" dirty="0"/>
-              <a:t> yum update -y</a:t>
-            </a:r>
-          </a:p>
-          <a:p>
-            <a:pPr marL="0" indent="0" fontAlgn="ctr">
-              <a:buNone/>
-            </a:pPr>
-            <a:r>
-              <a:rPr lang="en-US" dirty="0"/>
-              <a:t>-&gt; Install Docker</a:t>
-            </a:r>
-            <a:br>
-              <a:rPr lang="en-US" dirty="0"/>
-            </a:br>
-            <a:r>
-              <a:rPr lang="en-US" dirty="0"/>
-              <a:t>[ec2-user ~]$ </a:t>
-            </a:r>
-            <a:r>
-              <a:rPr lang="en-US" dirty="0" err="1"/>
-              <a:t>sudo</a:t>
-            </a:r>
-            <a:r>
-              <a:rPr lang="en-US" dirty="0"/>
-              <a:t> yum install docker -y</a:t>
-            </a:r>
-          </a:p>
-          <a:p>
-            <a:pPr marL="0" indent="0" fontAlgn="ctr">
-              <a:buNone/>
-            </a:pPr>
-            <a:r>
-              <a:rPr lang="en-US" dirty="0"/>
-              <a:t>-&gt; Start the Docker Service</a:t>
-            </a:r>
-            <a:br>
-              <a:rPr lang="en-US" dirty="0"/>
-            </a:br>
-            <a:r>
-              <a:rPr lang="en-US" dirty="0"/>
-              <a:t>[ec2-user ~]$ </a:t>
-            </a:r>
-            <a:r>
-              <a:rPr lang="en-US" dirty="0" err="1"/>
-              <a:t>sudo</a:t>
-            </a:r>
-            <a:r>
-              <a:rPr lang="en-US" dirty="0"/>
-              <a:t> service docker start</a:t>
-            </a:r>
-          </a:p>
-          <a:p>
-            <a:endParaRPr lang="en-US" dirty="0"/>
-          </a:p>
-        </p:txBody>
-      </p:sp>
-    </p:spTree>
-    <p:extLst>
-      <p:ext uri="{BB962C8B-B14F-4D97-AF65-F5344CB8AC3E}">
-        <p14:creationId xmlns:p14="http://schemas.microsoft.com/office/powerpoint/2010/main" val="1155773211"/>
-      </p:ext>
-    </p:extLst>
-  </p:cSld>
-  <p:clrMapOvr>
-    <a:masterClrMapping/>
-  </p:clrMapOvr>
-</p:sld>
-</file>
-
-<file path=ppt/slides/slide30.xml><?xml version="1.0" encoding="utf-8"?>
+<file path=ppt/slides/slide36.xml><?xml version="1.0" encoding="utf-8"?>
 <p:sld xmlns:a="http://schemas.openxmlformats.org/drawingml/2006/main" xmlns:r="http://schemas.openxmlformats.org/officeDocument/2006/relationships" xmlns:p="http://schemas.openxmlformats.org/presentationml/2006/main">
   <p:cSld>
     <p:spTree>

</xml_diff>

<commit_message>
Docker ppt updated with drivers slides.
</commit_message>
<xml_diff>
--- a/Docker/Docker.pptx
+++ b/Docker/Docker.pptx
@@ -41,6 +41,7 @@
     <p:sldId id="283" r:id="rId35"/>
     <p:sldId id="284" r:id="rId36"/>
     <p:sldId id="285" r:id="rId37"/>
+    <p:sldId id="292" r:id="rId38"/>
   </p:sldIdLst>
   <p:sldSz cx="12192000" cy="6858000"/>
   <p:notesSz cx="6858000" cy="9144000"/>
@@ -298,7 +299,7 @@
           <a:p>
             <a:fld id="{26BBFCAB-B0F0-4FAC-8889-D32BD0CBE9C3}" type="datetimeFigureOut">
               <a:rPr lang="en-US" smtClean="0"/>
-              <a:t>9/24/2017</a:t>
+              <a:t>9/25/2017</a:t>
             </a:fld>
             <a:endParaRPr lang="en-US"/>
           </a:p>
@@ -496,7 +497,7 @@
           <a:p>
             <a:fld id="{26BBFCAB-B0F0-4FAC-8889-D32BD0CBE9C3}" type="datetimeFigureOut">
               <a:rPr lang="en-US" smtClean="0"/>
-              <a:t>9/24/2017</a:t>
+              <a:t>9/25/2017</a:t>
             </a:fld>
             <a:endParaRPr lang="en-US"/>
           </a:p>
@@ -704,7 +705,7 @@
           <a:p>
             <a:fld id="{26BBFCAB-B0F0-4FAC-8889-D32BD0CBE9C3}" type="datetimeFigureOut">
               <a:rPr lang="en-US" smtClean="0"/>
-              <a:t>9/24/2017</a:t>
+              <a:t>9/25/2017</a:t>
             </a:fld>
             <a:endParaRPr lang="en-US"/>
           </a:p>
@@ -902,7 +903,7 @@
           <a:p>
             <a:fld id="{26BBFCAB-B0F0-4FAC-8889-D32BD0CBE9C3}" type="datetimeFigureOut">
               <a:rPr lang="en-US" smtClean="0"/>
-              <a:t>9/24/2017</a:t>
+              <a:t>9/25/2017</a:t>
             </a:fld>
             <a:endParaRPr lang="en-US"/>
           </a:p>
@@ -1177,7 +1178,7 @@
           <a:p>
             <a:fld id="{26BBFCAB-B0F0-4FAC-8889-D32BD0CBE9C3}" type="datetimeFigureOut">
               <a:rPr lang="en-US" smtClean="0"/>
-              <a:t>9/24/2017</a:t>
+              <a:t>9/25/2017</a:t>
             </a:fld>
             <a:endParaRPr lang="en-US"/>
           </a:p>
@@ -1442,7 +1443,7 @@
           <a:p>
             <a:fld id="{26BBFCAB-B0F0-4FAC-8889-D32BD0CBE9C3}" type="datetimeFigureOut">
               <a:rPr lang="en-US" smtClean="0"/>
-              <a:t>9/24/2017</a:t>
+              <a:t>9/25/2017</a:t>
             </a:fld>
             <a:endParaRPr lang="en-US"/>
           </a:p>
@@ -1854,7 +1855,7 @@
           <a:p>
             <a:fld id="{26BBFCAB-B0F0-4FAC-8889-D32BD0CBE9C3}" type="datetimeFigureOut">
               <a:rPr lang="en-US" smtClean="0"/>
-              <a:t>9/24/2017</a:t>
+              <a:t>9/25/2017</a:t>
             </a:fld>
             <a:endParaRPr lang="en-US"/>
           </a:p>
@@ -1995,7 +1996,7 @@
           <a:p>
             <a:fld id="{26BBFCAB-B0F0-4FAC-8889-D32BD0CBE9C3}" type="datetimeFigureOut">
               <a:rPr lang="en-US" smtClean="0"/>
-              <a:t>9/24/2017</a:t>
+              <a:t>9/25/2017</a:t>
             </a:fld>
             <a:endParaRPr lang="en-US"/>
           </a:p>
@@ -2108,7 +2109,7 @@
           <a:p>
             <a:fld id="{26BBFCAB-B0F0-4FAC-8889-D32BD0CBE9C3}" type="datetimeFigureOut">
               <a:rPr lang="en-US" smtClean="0"/>
-              <a:t>9/24/2017</a:t>
+              <a:t>9/25/2017</a:t>
             </a:fld>
             <a:endParaRPr lang="en-US"/>
           </a:p>
@@ -2419,7 +2420,7 @@
           <a:p>
             <a:fld id="{26BBFCAB-B0F0-4FAC-8889-D32BD0CBE9C3}" type="datetimeFigureOut">
               <a:rPr lang="en-US" smtClean="0"/>
-              <a:t>9/24/2017</a:t>
+              <a:t>9/25/2017</a:t>
             </a:fld>
             <a:endParaRPr lang="en-US"/>
           </a:p>
@@ -2707,7 +2708,7 @@
           <a:p>
             <a:fld id="{26BBFCAB-B0F0-4FAC-8889-D32BD0CBE9C3}" type="datetimeFigureOut">
               <a:rPr lang="en-US" smtClean="0"/>
-              <a:t>9/24/2017</a:t>
+              <a:t>9/25/2017</a:t>
             </a:fld>
             <a:endParaRPr lang="en-US"/>
           </a:p>
@@ -2948,7 +2949,7 @@
           <a:p>
             <a:fld id="{26BBFCAB-B0F0-4FAC-8889-D32BD0CBE9C3}" type="datetimeFigureOut">
               <a:rPr lang="en-US" smtClean="0"/>
-              <a:t>9/24/2017</a:t>
+              <a:t>9/25/2017</a:t>
             </a:fld>
             <a:endParaRPr lang="en-US"/>
           </a:p>
@@ -5262,6 +5263,20 @@
             </a:r>
           </a:p>
           <a:p>
+            <a:r>
+              <a:rPr lang="en-US" dirty="0"/>
+              <a:t>There can be multiple ENTRYPOINTS in a </a:t>
+            </a:r>
+            <a:r>
+              <a:rPr lang="en-US" dirty="0" err="1"/>
+              <a:t>Dockerfile</a:t>
+            </a:r>
+            <a:r>
+              <a:rPr lang="en-US" dirty="0"/>
+              <a:t>, only the last one will come into play and the others are ignored.</a:t>
+            </a:r>
+          </a:p>
+          <a:p>
             <a:endParaRPr lang="en-US" dirty="0"/>
           </a:p>
         </p:txBody>
@@ -5288,7 +5303,7 @@
         </p:blipFill>
         <p:spPr>
           <a:xfrm>
-            <a:off x="3205419" y="2931898"/>
+            <a:off x="3230133" y="3833941"/>
             <a:ext cx="5534025" cy="1809750"/>
           </a:xfrm>
           <a:prstGeom prst="rect">
@@ -8557,6 +8572,180 @@
     <p:extLst>
       <p:ext uri="{BB962C8B-B14F-4D97-AF65-F5344CB8AC3E}">
         <p14:creationId xmlns:p14="http://schemas.microsoft.com/office/powerpoint/2010/main" val="3412173972"/>
+      </p:ext>
+    </p:extLst>
+  </p:cSld>
+  <p:clrMapOvr>
+    <a:masterClrMapping/>
+  </p:clrMapOvr>
+</p:sld>
+</file>
+
+<file path=ppt/slides/slide37.xml><?xml version="1.0" encoding="utf-8"?>
+<p:sld xmlns:a="http://schemas.openxmlformats.org/drawingml/2006/main" xmlns:r="http://schemas.openxmlformats.org/officeDocument/2006/relationships" xmlns:p="http://schemas.openxmlformats.org/presentationml/2006/main">
+  <p:cSld>
+    <p:spTree>
+      <p:nvGrpSpPr>
+        <p:cNvPr id="1" name=""/>
+        <p:cNvGrpSpPr/>
+        <p:nvPr/>
+      </p:nvGrpSpPr>
+      <p:grpSpPr>
+        <a:xfrm>
+          <a:off x="0" y="0"/>
+          <a:ext cx="0" cy="0"/>
+          <a:chOff x="0" y="0"/>
+          <a:chExt cx="0" cy="0"/>
+        </a:xfrm>
+      </p:grpSpPr>
+      <p:sp>
+        <p:nvSpPr>
+          <p:cNvPr id="2" name="Title 1">
+            <a:extLst>
+              <a:ext uri="{FF2B5EF4-FFF2-40B4-BE49-F238E27FC236}">
+                <a16:creationId xmlns:a16="http://schemas.microsoft.com/office/drawing/2014/main" id="{241A381A-BF8F-4FEF-AA09-DF2FC176FD83}"/>
+              </a:ext>
+            </a:extLst>
+          </p:cNvPr>
+          <p:cNvSpPr>
+            <a:spLocks noGrp="1"/>
+          </p:cNvSpPr>
+          <p:nvPr>
+            <p:ph type="title"/>
+          </p:nvPr>
+        </p:nvSpPr>
+        <p:spPr/>
+        <p:txBody>
+          <a:bodyPr/>
+          <a:lstStyle/>
+          <a:p>
+            <a:r>
+              <a:rPr lang="en-US" dirty="0"/>
+              <a:t>Storage and execution drivers</a:t>
+            </a:r>
+          </a:p>
+        </p:txBody>
+      </p:sp>
+      <p:sp>
+        <p:nvSpPr>
+          <p:cNvPr id="3" name="Content Placeholder 2">
+            <a:extLst>
+              <a:ext uri="{FF2B5EF4-FFF2-40B4-BE49-F238E27FC236}">
+                <a16:creationId xmlns:a16="http://schemas.microsoft.com/office/drawing/2014/main" id="{4BCB53DB-C44F-403C-8D3A-FB4C6E9E9DCB}"/>
+              </a:ext>
+            </a:extLst>
+          </p:cNvPr>
+          <p:cNvSpPr>
+            <a:spLocks noGrp="1"/>
+          </p:cNvSpPr>
+          <p:nvPr>
+            <p:ph idx="1"/>
+          </p:nvPr>
+        </p:nvSpPr>
+        <p:spPr/>
+        <p:txBody>
+          <a:bodyPr/>
+          <a:lstStyle/>
+          <a:p>
+            <a:r>
+              <a:rPr lang="en-US" dirty="0"/>
+              <a:t>Storage driver used by docker –</a:t>
+            </a:r>
+            <a:r>
+              <a:rPr lang="en-US" dirty="0" err="1">
+                <a:solidFill>
+                  <a:srgbClr val="FF0000"/>
+                </a:solidFill>
+              </a:rPr>
+              <a:t>aufs</a:t>
+            </a:r>
+            <a:r>
+              <a:rPr lang="en-US" dirty="0"/>
+              <a:t>.</a:t>
+            </a:r>
+          </a:p>
+          <a:p>
+            <a:r>
+              <a:rPr lang="en-US" dirty="0"/>
+              <a:t>AUFS is a </a:t>
+            </a:r>
+            <a:r>
+              <a:rPr lang="en-US" i="1" dirty="0"/>
+              <a:t>union filesystem</a:t>
+            </a:r>
+            <a:r>
+              <a:rPr lang="en-US" dirty="0"/>
+              <a:t>, which means that it layers multiple directories on a single Linux host and presents them as a single directory. These directories are called </a:t>
+            </a:r>
+            <a:r>
+              <a:rPr lang="en-US" i="1" dirty="0"/>
+              <a:t>branches</a:t>
+            </a:r>
+            <a:r>
+              <a:rPr lang="en-US" dirty="0"/>
+              <a:t> in AUFS terminology, and </a:t>
+            </a:r>
+            <a:r>
+              <a:rPr lang="en-US" i="1" dirty="0"/>
+              <a:t>layers</a:t>
+            </a:r>
+            <a:r>
+              <a:rPr lang="en-US" dirty="0"/>
+              <a:t> in Docker terminology. The unification process is referred to a </a:t>
+            </a:r>
+            <a:r>
+              <a:rPr lang="en-US" dirty="0" err="1"/>
+              <a:t>a</a:t>
+            </a:r>
+            <a:r>
+              <a:rPr lang="en-US" dirty="0"/>
+              <a:t> </a:t>
+            </a:r>
+            <a:r>
+              <a:rPr lang="en-US" i="1" dirty="0"/>
+              <a:t>union mount</a:t>
+            </a:r>
+            <a:r>
+              <a:rPr lang="en-US" dirty="0"/>
+              <a:t>.</a:t>
+            </a:r>
+          </a:p>
+          <a:p>
+            <a:r>
+              <a:rPr lang="en-US" dirty="0"/>
+              <a:t>Execution driver used by docker is – </a:t>
+            </a:r>
+            <a:r>
+              <a:rPr lang="en-US" dirty="0">
+                <a:solidFill>
+                  <a:srgbClr val="FF0000"/>
+                </a:solidFill>
+              </a:rPr>
+              <a:t>lib container</a:t>
+            </a:r>
+            <a:r>
+              <a:rPr lang="en-US" dirty="0"/>
+              <a:t>(Docker INC developed this recommended one) and </a:t>
+            </a:r>
+            <a:r>
+              <a:rPr lang="en-US" dirty="0">
+                <a:solidFill>
+                  <a:srgbClr val="FF0000"/>
+                </a:solidFill>
+              </a:rPr>
+              <a:t>LXC</a:t>
+            </a:r>
+            <a:r>
+              <a:rPr lang="en-US" dirty="0"/>
+              <a:t>(this is a third party one not so recommended)</a:t>
+            </a:r>
+          </a:p>
+        </p:txBody>
+      </p:sp>
+    </p:spTree>
+    <p:extLst>
+      <p:ext uri="{BB962C8B-B14F-4D97-AF65-F5344CB8AC3E}">
+        <p14:creationId xmlns:p14="http://schemas.microsoft.com/office/powerpoint/2010/main" val="3378329914"/>
       </p:ext>
     </p:extLst>
   </p:cSld>

</xml_diff>